<commit_message>
Presentation updates + added HF transfer video to 02.1_transfer notebook.
</commit_message>
<xml_diff>
--- a/presentations/02_transfer_learn.pptx
+++ b/presentations/02_transfer_learn.pptx
@@ -5,7 +5,7 @@
     <p:sldMasterId id="2147483648" r:id="rId1"/>
   </p:sldMasterIdLst>
   <p:notesMasterIdLst>
-    <p:notesMasterId r:id="rId20"/>
+    <p:notesMasterId r:id="rId19"/>
   </p:notesMasterIdLst>
   <p:sldIdLst>
     <p:sldId id="326" r:id="rId2"/>
@@ -15,17 +15,16 @@
     <p:sldId id="338" r:id="rId6"/>
     <p:sldId id="339" r:id="rId7"/>
     <p:sldId id="340" r:id="rId8"/>
-    <p:sldId id="323" r:id="rId9"/>
+    <p:sldId id="347" r:id="rId9"/>
     <p:sldId id="279" r:id="rId10"/>
     <p:sldId id="328" r:id="rId11"/>
     <p:sldId id="331" r:id="rId12"/>
     <p:sldId id="332" r:id="rId13"/>
     <p:sldId id="333" r:id="rId14"/>
-    <p:sldId id="344" r:id="rId15"/>
-    <p:sldId id="341" r:id="rId16"/>
-    <p:sldId id="345" r:id="rId17"/>
-    <p:sldId id="335" r:id="rId18"/>
-    <p:sldId id="346" r:id="rId19"/>
+    <p:sldId id="341" r:id="rId15"/>
+    <p:sldId id="345" r:id="rId16"/>
+    <p:sldId id="335" r:id="rId17"/>
+    <p:sldId id="346" r:id="rId18"/>
   </p:sldIdLst>
   <p:sldSz cx="12192000" cy="6858000"/>
   <p:notesSz cx="6858000" cy="9144000"/>
@@ -225,7 +224,7 @@
           <a:p>
             <a:fld id="{FD93C9B2-20F6-4DB1-B471-224337D0AC79}" type="datetimeFigureOut">
               <a:rPr lang="en-US" smtClean="0"/>
-              <a:t>9/20/2022</a:t>
+              <a:t>10/11/2022</a:t>
             </a:fld>
             <a:endParaRPr lang="en-US"/>
           </a:p>
@@ -635,55 +634,35 @@
           <a:bodyPr/>
           <a:lstStyle/>
           <a:p>
+            <a:pPr marL="0" marR="0" lvl="0" indent="0" algn="l" defTabSz="914400" rtl="0" eaLnBrk="1" fontAlgn="auto" latinLnBrk="0" hangingPunct="1">
+              <a:lnSpc>
+                <a:spcPct val="100000"/>
+              </a:lnSpc>
+              <a:spcBef>
+                <a:spcPts val="0"/>
+              </a:spcBef>
+              <a:spcAft>
+                <a:spcPts val="0"/>
+              </a:spcAft>
+              <a:buClrTx/>
+              <a:buSzTx/>
+              <a:buFontTx/>
+              <a:buNone/>
+              <a:tabLst/>
+              <a:defRPr/>
+            </a:pPr>
+            <a:r>
+              <a:rPr lang="en-US" dirty="0">
+                <a:latin typeface="+mn-lt"/>
+              </a:rPr>
+              <a:t>To save and retrieve the entire model, use the example code displayed here as a template.</a:t>
+            </a:r>
+          </a:p>
+          <a:p>
             <a:pPr algn="l"/>
-            <a:r>
-              <a:rPr lang="en-US" dirty="0"/>
-              <a:t>Let’s dig a little deeper into the details of transfer learning.  It is generally not a good idea to train a very large DNN from scratch: instead, you should always try to find an existing neural network that accomplishes a similar task to the one you are trying to tackle, then reuse the lower layers of this network. If done well, transfer learning not only speeds up training considerably, but also requires significantly less training data.</a:t>
-            </a:r>
-          </a:p>
-          <a:p>
-            <a:pPr algn="l"/>
-            <a:endParaRPr lang="en-US" dirty="0"/>
-          </a:p>
-          <a:p>
-            <a:pPr algn="l"/>
-            <a:r>
-              <a:rPr lang="en-US" dirty="0"/>
-              <a:t>Suppose you have access to a DNN that was trained to classify pictures into 100 different categories, including animals, plants, vehicles, and everyday objects. You now want to train a DNN to classify specific types of vehicles. These tasks are very similar, even partly overlapping, so you should try to reuse parts of the first network as shown here.</a:t>
-            </a:r>
-          </a:p>
-          <a:p>
-            <a:pPr algn="l"/>
-            <a:endParaRPr lang="en-US" dirty="0"/>
-          </a:p>
-          <a:p>
-            <a:pPr algn="l"/>
-            <a:r>
-              <a:rPr lang="en-US" dirty="0"/>
-              <a:t>The output layer of the original model will usually be replaced because it is most likely not useful at all for the new task, and it may not even have the right number of outputs for the new task.  </a:t>
-            </a:r>
-          </a:p>
-          <a:p>
-            <a:pPr algn="l"/>
-            <a:endParaRPr lang="en-US" dirty="0"/>
-          </a:p>
-          <a:p>
-            <a:pPr algn="l"/>
-            <a:r>
-              <a:rPr lang="en-US" dirty="0"/>
-              <a:t>In like manner, the upper hidden layers of the original model are less likely to be as useful as the lower layers, since the high-level features that are most useful for the new task may differ significantly from the ones that were most useful for the original task. You want to find the right number of layers to reuse.</a:t>
-            </a:r>
-          </a:p>
-          <a:p>
-            <a:pPr algn="l"/>
-            <a:endParaRPr lang="en-US" dirty="0"/>
-          </a:p>
-          <a:p>
-            <a:pPr algn="l"/>
-            <a:r>
-              <a:rPr lang="en-US" dirty="0"/>
-              <a:t>Try freezing all the reused layers first (i.e., make their weights non-trainable so that Gradient Descent won’t modify them), then train your model and see how it performs. Then try unfreezing one or two of the top hidden layers to let backpropagation tweak them and see if performance improves. The more training data you have, the more layers you can unfreeze. It is also useful to reduce the learning rate when you unfreeze reused layers: this will avoid wrecking their fine-tuned weights.</a:t>
-            </a:r>
+            <a:endParaRPr lang="en-US" dirty="0">
+              <a:latin typeface="+mn-lt"/>
+            </a:endParaRPr>
           </a:p>
         </p:txBody>
       </p:sp>
@@ -704,7 +683,7 @@
           <a:p>
             <a:fld id="{3148858F-F1DB-4027-9C85-CCA6849540DD}" type="slidenum">
               <a:rPr lang="en-US" smtClean="0"/>
-              <a:t>10</a:t>
+              <a:t>11</a:t>
             </a:fld>
             <a:endParaRPr lang="en-US"/>
           </a:p>
@@ -713,7 +692,7 @@
     </p:spTree>
     <p:extLst>
       <p:ext uri="{BB962C8B-B14F-4D97-AF65-F5344CB8AC3E}">
-        <p14:creationId xmlns:p14="http://schemas.microsoft.com/office/powerpoint/2010/main" val="3451864319"/>
+        <p14:creationId xmlns:p14="http://schemas.microsoft.com/office/powerpoint/2010/main" val="321616863"/>
       </p:ext>
     </p:extLst>
   </p:cSld>
@@ -788,7 +767,7 @@
               <a:rPr lang="en-US" dirty="0">
                 <a:latin typeface="+mn-lt"/>
               </a:rPr>
-              <a:t>To save and retrieve the entire model, use the example code displayed here as a template.</a:t>
+              <a:t>To save and retrieve the model’s trained weights, use the example code displayed here as a template.</a:t>
             </a:r>
           </a:p>
           <a:p>
@@ -816,7 +795,7 @@
           <a:p>
             <a:fld id="{3148858F-F1DB-4027-9C85-CCA6849540DD}" type="slidenum">
               <a:rPr lang="en-US" smtClean="0"/>
-              <a:t>11</a:t>
+              <a:t>12</a:t>
             </a:fld>
             <a:endParaRPr lang="en-US"/>
           </a:p>
@@ -825,7 +804,7 @@
     </p:spTree>
     <p:extLst>
       <p:ext uri="{BB962C8B-B14F-4D97-AF65-F5344CB8AC3E}">
-        <p14:creationId xmlns:p14="http://schemas.microsoft.com/office/powerpoint/2010/main" val="321616863"/>
+        <p14:creationId xmlns:p14="http://schemas.microsoft.com/office/powerpoint/2010/main" val="1931056132"/>
       </p:ext>
     </p:extLst>
   </p:cSld>
@@ -900,7 +879,54 @@
               <a:rPr lang="en-US" dirty="0">
                 <a:latin typeface="+mn-lt"/>
               </a:rPr>
-              <a:t>To save and retrieve the model’s trained weights, use the example code displayed here as a template.</a:t>
+              <a:t>To save and retrieve just the model’s architecture (the layers but not the trained weights), use the example code displayed here as a template.</a:t>
+            </a:r>
+          </a:p>
+          <a:p>
+            <a:pPr marL="0" marR="0" lvl="0" indent="0" algn="l" defTabSz="914400" rtl="0" eaLnBrk="1" fontAlgn="auto" latinLnBrk="0" hangingPunct="1">
+              <a:lnSpc>
+                <a:spcPct val="100000"/>
+              </a:lnSpc>
+              <a:spcBef>
+                <a:spcPts val="0"/>
+              </a:spcBef>
+              <a:spcAft>
+                <a:spcPts val="0"/>
+              </a:spcAft>
+              <a:buClrTx/>
+              <a:buSzTx/>
+              <a:buFontTx/>
+              <a:buNone/>
+              <a:tabLst/>
+              <a:defRPr/>
+            </a:pPr>
+            <a:endParaRPr lang="en-US" dirty="0">
+              <a:latin typeface="+mn-lt"/>
+            </a:endParaRPr>
+          </a:p>
+          <a:p>
+            <a:pPr marL="0" marR="0" lvl="0" indent="0" algn="l" defTabSz="914400" rtl="0" eaLnBrk="1" fontAlgn="auto" latinLnBrk="0" hangingPunct="1">
+              <a:lnSpc>
+                <a:spcPct val="100000"/>
+              </a:lnSpc>
+              <a:spcBef>
+                <a:spcPts val="0"/>
+              </a:spcBef>
+              <a:spcAft>
+                <a:spcPts val="0"/>
+              </a:spcAft>
+              <a:buClrTx/>
+              <a:buSzTx/>
+              <a:buFontTx/>
+              <a:buNone/>
+              <a:tabLst/>
+              <a:defRPr/>
+            </a:pPr>
+            <a:r>
+              <a:rPr lang="en-US" dirty="0">
+                <a:latin typeface="+mn-lt"/>
+              </a:rPr>
+              <a:t>JSON = Java Script Object Notation.</a:t>
             </a:r>
           </a:p>
           <a:p>
@@ -928,7 +954,7 @@
           <a:p>
             <a:fld id="{3148858F-F1DB-4027-9C85-CCA6849540DD}" type="slidenum">
               <a:rPr lang="en-US" smtClean="0"/>
-              <a:t>12</a:t>
+              <a:t>13</a:t>
             </a:fld>
             <a:endParaRPr lang="en-US"/>
           </a:p>
@@ -937,7 +963,7 @@
     </p:spTree>
     <p:extLst>
       <p:ext uri="{BB962C8B-B14F-4D97-AF65-F5344CB8AC3E}">
-        <p14:creationId xmlns:p14="http://schemas.microsoft.com/office/powerpoint/2010/main" val="1931056132"/>
+        <p14:creationId xmlns:p14="http://schemas.microsoft.com/office/powerpoint/2010/main" val="47932266"/>
       </p:ext>
     </p:extLst>
   </p:cSld>
@@ -1008,65 +1034,7 @@
               <a:tabLst/>
               <a:defRPr/>
             </a:pPr>
-            <a:r>
-              <a:rPr lang="en-US" dirty="0">
-                <a:latin typeface="+mn-lt"/>
-              </a:rPr>
-              <a:t>To save and retrieve just the model’s architecture (the layers but not the trained weights), use the example code displayed here as a template.</a:t>
-            </a:r>
-          </a:p>
-          <a:p>
-            <a:pPr marL="0" marR="0" lvl="0" indent="0" algn="l" defTabSz="914400" rtl="0" eaLnBrk="1" fontAlgn="auto" latinLnBrk="0" hangingPunct="1">
-              <a:lnSpc>
-                <a:spcPct val="100000"/>
-              </a:lnSpc>
-              <a:spcBef>
-                <a:spcPts val="0"/>
-              </a:spcBef>
-              <a:spcAft>
-                <a:spcPts val="0"/>
-              </a:spcAft>
-              <a:buClrTx/>
-              <a:buSzTx/>
-              <a:buFontTx/>
-              <a:buNone/>
-              <a:tabLst/>
-              <a:defRPr/>
-            </a:pPr>
-            <a:endParaRPr lang="en-US" dirty="0">
-              <a:latin typeface="+mn-lt"/>
-            </a:endParaRPr>
-          </a:p>
-          <a:p>
-            <a:pPr marL="0" marR="0" lvl="0" indent="0" algn="l" defTabSz="914400" rtl="0" eaLnBrk="1" fontAlgn="auto" latinLnBrk="0" hangingPunct="1">
-              <a:lnSpc>
-                <a:spcPct val="100000"/>
-              </a:lnSpc>
-              <a:spcBef>
-                <a:spcPts val="0"/>
-              </a:spcBef>
-              <a:spcAft>
-                <a:spcPts val="0"/>
-              </a:spcAft>
-              <a:buClrTx/>
-              <a:buSzTx/>
-              <a:buFontTx/>
-              <a:buNone/>
-              <a:tabLst/>
-              <a:defRPr/>
-            </a:pPr>
-            <a:r>
-              <a:rPr lang="en-US" dirty="0">
-                <a:latin typeface="+mn-lt"/>
-              </a:rPr>
-              <a:t>JSON = Java Script Object Notation.</a:t>
-            </a:r>
-          </a:p>
-          <a:p>
-            <a:pPr algn="l"/>
-            <a:endParaRPr lang="en-US" dirty="0">
-              <a:latin typeface="+mn-lt"/>
-            </a:endParaRPr>
+            <a:endParaRPr lang="en-US" dirty="0"/>
           </a:p>
         </p:txBody>
       </p:sp>
@@ -1087,7 +1055,7 @@
           <a:p>
             <a:fld id="{3148858F-F1DB-4027-9C85-CCA6849540DD}" type="slidenum">
               <a:rPr lang="en-US" smtClean="0"/>
-              <a:t>13</a:t>
+              <a:t>14</a:t>
             </a:fld>
             <a:endParaRPr lang="en-US"/>
           </a:p>
@@ -1096,7 +1064,7 @@
     </p:spTree>
     <p:extLst>
       <p:ext uri="{BB962C8B-B14F-4D97-AF65-F5344CB8AC3E}">
-        <p14:creationId xmlns:p14="http://schemas.microsoft.com/office/powerpoint/2010/main" val="47932266"/>
+        <p14:creationId xmlns:p14="http://schemas.microsoft.com/office/powerpoint/2010/main" val="3618987416"/>
       </p:ext>
     </p:extLst>
   </p:cSld>
@@ -1150,12 +1118,12 @@
           <a:bodyPr/>
           <a:lstStyle/>
           <a:p>
-            <a:pPr algn="l"/>
-            <a:r>
-              <a:rPr lang="en-US" dirty="0">
-                <a:latin typeface="+mn-lt"/>
-              </a:rPr>
-              <a:t>https://huggingface.co/</a:t>
+            <a:pPr defTabSz="939363">
+              <a:defRPr/>
+            </a:pPr>
+            <a:r>
+              <a:rPr lang="en-US" dirty="0"/>
+              <a:t>The learning experience for this workshop starts on page 150 of the textbook.  </a:t>
             </a:r>
           </a:p>
         </p:txBody>
@@ -1177,7 +1145,7 @@
           <a:p>
             <a:fld id="{3148858F-F1DB-4027-9C85-CCA6849540DD}" type="slidenum">
               <a:rPr lang="en-US" smtClean="0"/>
-              <a:t>14</a:t>
+              <a:t>15</a:t>
             </a:fld>
             <a:endParaRPr lang="en-US"/>
           </a:p>
@@ -1186,7 +1154,7 @@
     </p:spTree>
     <p:extLst>
       <p:ext uri="{BB962C8B-B14F-4D97-AF65-F5344CB8AC3E}">
-        <p14:creationId xmlns:p14="http://schemas.microsoft.com/office/powerpoint/2010/main" val="2596715463"/>
+        <p14:creationId xmlns:p14="http://schemas.microsoft.com/office/powerpoint/2010/main" val="1974960137"/>
       </p:ext>
     </p:extLst>
   </p:cSld>
@@ -1240,22 +1208,8 @@
           <a:bodyPr/>
           <a:lstStyle/>
           <a:p>
-            <a:pPr marL="0" marR="0" lvl="0" indent="0" algn="l" defTabSz="914400" rtl="0" eaLnBrk="1" fontAlgn="auto" latinLnBrk="0" hangingPunct="1">
-              <a:lnSpc>
-                <a:spcPct val="100000"/>
-              </a:lnSpc>
-              <a:spcBef>
-                <a:spcPts val="0"/>
-              </a:spcBef>
-              <a:spcAft>
-                <a:spcPts val="0"/>
-              </a:spcAft>
-              <a:buClrTx/>
-              <a:buSzTx/>
-              <a:buFontTx/>
+            <a:pPr marL="0" indent="0" algn="l">
               <a:buNone/>
-              <a:tabLst/>
-              <a:defRPr/>
             </a:pPr>
             <a:endParaRPr lang="en-US" dirty="0"/>
           </a:p>
@@ -1278,7 +1232,7 @@
           <a:p>
             <a:fld id="{3148858F-F1DB-4027-9C85-CCA6849540DD}" type="slidenum">
               <a:rPr lang="en-US" smtClean="0"/>
-              <a:t>15</a:t>
+              <a:t>16</a:t>
             </a:fld>
             <a:endParaRPr lang="en-US"/>
           </a:p>
@@ -1287,7 +1241,7 @@
     </p:spTree>
     <p:extLst>
       <p:ext uri="{BB962C8B-B14F-4D97-AF65-F5344CB8AC3E}">
-        <p14:creationId xmlns:p14="http://schemas.microsoft.com/office/powerpoint/2010/main" val="3618987416"/>
+        <p14:creationId xmlns:p14="http://schemas.microsoft.com/office/powerpoint/2010/main" val="108490749"/>
       </p:ext>
     </p:extLst>
   </p:cSld>
@@ -1341,100 +1295,14 @@
           <a:bodyPr/>
           <a:lstStyle/>
           <a:p>
-            <a:pPr defTabSz="939363">
-              <a:defRPr/>
-            </a:pPr>
-            <a:r>
-              <a:rPr lang="en-US" dirty="0"/>
-              <a:t>The learning experience for this workshop starts on page 150 of the textbook.  </a:t>
-            </a:r>
-          </a:p>
-        </p:txBody>
-      </p:sp>
-      <p:sp>
-        <p:nvSpPr>
-          <p:cNvPr id="4" name="Slide Number Placeholder 3"/>
-          <p:cNvSpPr>
-            <a:spLocks noGrp="1"/>
-          </p:cNvSpPr>
-          <p:nvPr>
-            <p:ph type="sldNum" sz="quarter" idx="5"/>
-          </p:nvPr>
-        </p:nvSpPr>
-        <p:spPr/>
-        <p:txBody>
-          <a:bodyPr/>
-          <a:lstStyle/>
-          <a:p>
-            <a:fld id="{3148858F-F1DB-4027-9C85-CCA6849540DD}" type="slidenum">
-              <a:rPr lang="en-US" smtClean="0"/>
-              <a:t>16</a:t>
-            </a:fld>
-            <a:endParaRPr lang="en-US"/>
-          </a:p>
-        </p:txBody>
-      </p:sp>
-    </p:spTree>
-    <p:extLst>
-      <p:ext uri="{BB962C8B-B14F-4D97-AF65-F5344CB8AC3E}">
-        <p14:creationId xmlns:p14="http://schemas.microsoft.com/office/powerpoint/2010/main" val="1974960137"/>
-      </p:ext>
-    </p:extLst>
-  </p:cSld>
-  <p:clrMapOvr>
-    <a:masterClrMapping/>
-  </p:clrMapOvr>
-</p:notes>
-</file>
-
-<file path=ppt/notesSlides/notesSlide17.xml><?xml version="1.0" encoding="utf-8"?>
-<p:notes xmlns:a="http://schemas.openxmlformats.org/drawingml/2006/main" xmlns:r="http://schemas.openxmlformats.org/officeDocument/2006/relationships" xmlns:p="http://schemas.openxmlformats.org/presentationml/2006/main">
-  <p:cSld>
-    <p:spTree>
-      <p:nvGrpSpPr>
-        <p:cNvPr id="1" name=""/>
-        <p:cNvGrpSpPr/>
-        <p:nvPr/>
-      </p:nvGrpSpPr>
-      <p:grpSpPr>
-        <a:xfrm>
-          <a:off x="0" y="0"/>
-          <a:ext cx="0" cy="0"/>
-          <a:chOff x="0" y="0"/>
-          <a:chExt cx="0" cy="0"/>
-        </a:xfrm>
-      </p:grpSpPr>
-      <p:sp>
-        <p:nvSpPr>
-          <p:cNvPr id="2" name="Slide Image Placeholder 1"/>
-          <p:cNvSpPr>
-            <a:spLocks noGrp="1" noRot="1" noChangeAspect="1"/>
-          </p:cNvSpPr>
-          <p:nvPr>
-            <p:ph type="sldImg"/>
-          </p:nvPr>
-        </p:nvSpPr>
-        <p:spPr/>
-      </p:sp>
-      <p:sp>
-        <p:nvSpPr>
-          <p:cNvPr id="3" name="Notes Placeholder 2"/>
-          <p:cNvSpPr>
-            <a:spLocks noGrp="1"/>
-          </p:cNvSpPr>
-          <p:nvPr>
-            <p:ph type="body" idx="1"/>
-          </p:nvPr>
-        </p:nvSpPr>
-        <p:spPr/>
-        <p:txBody>
-          <a:bodyPr/>
-          <a:lstStyle/>
-          <a:p>
-            <a:pPr marL="0" indent="0" algn="l">
-              <a:buNone/>
-            </a:pPr>
-            <a:endParaRPr lang="en-US" dirty="0"/>
+            <a:endParaRPr lang="en-US" dirty="0">
+              <a:latin typeface="Palatino Linotype" panose="02040502050505030304" pitchFamily="18" charset="0"/>
+            </a:endParaRPr>
+          </a:p>
+          <a:p>
+            <a:endParaRPr lang="en-US" dirty="0">
+              <a:latin typeface="Palatino Linotype" panose="02040502050505030304" pitchFamily="18" charset="0"/>
+            </a:endParaRPr>
           </a:p>
         </p:txBody>
       </p:sp>
@@ -1456,97 +1324,6 @@
             <a:fld id="{3148858F-F1DB-4027-9C85-CCA6849540DD}" type="slidenum">
               <a:rPr lang="en-US" smtClean="0"/>
               <a:t>17</a:t>
-            </a:fld>
-            <a:endParaRPr lang="en-US"/>
-          </a:p>
-        </p:txBody>
-      </p:sp>
-    </p:spTree>
-    <p:extLst>
-      <p:ext uri="{BB962C8B-B14F-4D97-AF65-F5344CB8AC3E}">
-        <p14:creationId xmlns:p14="http://schemas.microsoft.com/office/powerpoint/2010/main" val="108490749"/>
-      </p:ext>
-    </p:extLst>
-  </p:cSld>
-  <p:clrMapOvr>
-    <a:masterClrMapping/>
-  </p:clrMapOvr>
-</p:notes>
-</file>
-
-<file path=ppt/notesSlides/notesSlide18.xml><?xml version="1.0" encoding="utf-8"?>
-<p:notes xmlns:a="http://schemas.openxmlformats.org/drawingml/2006/main" xmlns:r="http://schemas.openxmlformats.org/officeDocument/2006/relationships" xmlns:p="http://schemas.openxmlformats.org/presentationml/2006/main">
-  <p:cSld>
-    <p:spTree>
-      <p:nvGrpSpPr>
-        <p:cNvPr id="1" name=""/>
-        <p:cNvGrpSpPr/>
-        <p:nvPr/>
-      </p:nvGrpSpPr>
-      <p:grpSpPr>
-        <a:xfrm>
-          <a:off x="0" y="0"/>
-          <a:ext cx="0" cy="0"/>
-          <a:chOff x="0" y="0"/>
-          <a:chExt cx="0" cy="0"/>
-        </a:xfrm>
-      </p:grpSpPr>
-      <p:sp>
-        <p:nvSpPr>
-          <p:cNvPr id="2" name="Slide Image Placeholder 1"/>
-          <p:cNvSpPr>
-            <a:spLocks noGrp="1" noRot="1" noChangeAspect="1"/>
-          </p:cNvSpPr>
-          <p:nvPr>
-            <p:ph type="sldImg"/>
-          </p:nvPr>
-        </p:nvSpPr>
-        <p:spPr/>
-      </p:sp>
-      <p:sp>
-        <p:nvSpPr>
-          <p:cNvPr id="3" name="Notes Placeholder 2"/>
-          <p:cNvSpPr>
-            <a:spLocks noGrp="1"/>
-          </p:cNvSpPr>
-          <p:nvPr>
-            <p:ph type="body" idx="1"/>
-          </p:nvPr>
-        </p:nvSpPr>
-        <p:spPr/>
-        <p:txBody>
-          <a:bodyPr/>
-          <a:lstStyle/>
-          <a:p>
-            <a:endParaRPr lang="en-US" dirty="0">
-              <a:latin typeface="Palatino Linotype" panose="02040502050505030304" pitchFamily="18" charset="0"/>
-            </a:endParaRPr>
-          </a:p>
-          <a:p>
-            <a:endParaRPr lang="en-US" dirty="0">
-              <a:latin typeface="Palatino Linotype" panose="02040502050505030304" pitchFamily="18" charset="0"/>
-            </a:endParaRPr>
-          </a:p>
-        </p:txBody>
-      </p:sp>
-      <p:sp>
-        <p:nvSpPr>
-          <p:cNvPr id="4" name="Slide Number Placeholder 3"/>
-          <p:cNvSpPr>
-            <a:spLocks noGrp="1"/>
-          </p:cNvSpPr>
-          <p:nvPr>
-            <p:ph type="sldNum" sz="quarter" idx="5"/>
-          </p:nvPr>
-        </p:nvSpPr>
-        <p:spPr/>
-        <p:txBody>
-          <a:bodyPr/>
-          <a:lstStyle/>
-          <a:p>
-            <a:fld id="{3148858F-F1DB-4027-9C85-CCA6849540DD}" type="slidenum">
-              <a:rPr lang="en-US" smtClean="0"/>
-              <a:t>18</a:t>
             </a:fld>
             <a:endParaRPr lang="en-US"/>
           </a:p>
@@ -1612,7 +1389,7 @@
             <a:pPr algn="l"/>
             <a:r>
               <a:rPr lang="en-US" dirty="0"/>
-              <a:t>Start with a definition from Ian Goodfellow and Yoshua Bengio’s book – </a:t>
+              <a:t>Definition from Ian Goodfellow and Yoshua Bengio’s book – </a:t>
             </a:r>
             <a:r>
               <a:rPr lang="en-US" i="1" dirty="0"/>
@@ -1858,32 +1635,53 @@
               <a:buAutoNum type="arabicPeriod"/>
             </a:pPr>
             <a:r>
+              <a:rPr lang="en-US" b="1" i="1" dirty="0">
+                <a:effectLst/>
+                <a:latin typeface="Noto serif" panose="02020600060500020200" pitchFamily="18" charset="0"/>
+              </a:rPr>
+              <a:t>Improved baseline performance</a:t>
+            </a:r>
+            <a:r>
+              <a:rPr lang="en-US" b="1" dirty="0">
+                <a:effectLst/>
+                <a:latin typeface="Noto serif" panose="02020600060500020200" pitchFamily="18" charset="0"/>
+              </a:rPr>
+              <a:t>: </a:t>
+            </a:r>
+            <a:r>
+              <a:rPr lang="en-US" b="0" dirty="0">
+                <a:effectLst/>
+                <a:latin typeface="Noto serif" panose="02020600060500020200" pitchFamily="18" charset="0"/>
+              </a:rPr>
+              <a:t>When we augment the knowledge of an isolated learner (also known as an </a:t>
+            </a:r>
+            <a:r>
               <a:rPr lang="en-US" b="1" i="0" dirty="0">
                 <a:effectLst/>
                 <a:latin typeface="Noto serif" panose="02020600060500020200" pitchFamily="18" charset="0"/>
               </a:rPr>
-              <a:t>Improved baseline performance</a:t>
+              <a:t>ignorant learner</a:t>
             </a:r>
             <a:r>
               <a:rPr lang="en-US" b="0" dirty="0">
                 <a:effectLst/>
                 <a:latin typeface="Noto serif" panose="02020600060500020200" pitchFamily="18" charset="0"/>
               </a:rPr>
-              <a:t>: When we augment the knowledge of an isolated learner (also known as an </a:t>
-            </a:r>
-            <a:r>
-              <a:rPr lang="en-US" b="1" i="0" dirty="0">
+              <a:t>) with knowledge from a source model, baseline performance may improve due to this knowledge transfer.  We have a </a:t>
+            </a:r>
+            <a:r>
+              <a:rPr lang="en-US" b="1" dirty="0">
                 <a:effectLst/>
                 <a:latin typeface="Noto serif" panose="02020600060500020200" pitchFamily="18" charset="0"/>
               </a:rPr>
-              <a:t>ignorant learner</a:t>
+              <a:t>higher start</a:t>
             </a:r>
             <a:r>
               <a:rPr lang="en-US" b="0" dirty="0">
                 <a:effectLst/>
                 <a:latin typeface="Noto serif" panose="02020600060500020200" pitchFamily="18" charset="0"/>
               </a:rPr>
-              <a:t>) with knowledge from a source model, the baseline performance might improve due to this knowledge transfer.</a:t>
+              <a:t>. </a:t>
             </a:r>
           </a:p>
           <a:p>
@@ -1891,37 +1689,76 @@
               <a:buAutoNum type="arabicPeriod"/>
             </a:pPr>
             <a:r>
-              <a:rPr lang="en-US" b="1" i="0" dirty="0">
+              <a:rPr lang="en-US" b="1" i="1" dirty="0">
                 <a:effectLst/>
                 <a:latin typeface="Noto serif" panose="02020600060500020200" pitchFamily="18" charset="0"/>
               </a:rPr>
-              <a:t>Model-development time</a:t>
+              <a:t>Model training time</a:t>
+            </a:r>
+            <a:r>
+              <a:rPr lang="en-US" b="0" i="1" dirty="0">
+                <a:effectLst/>
+                <a:latin typeface="Noto serif" panose="02020600060500020200" pitchFamily="18" charset="0"/>
+              </a:rPr>
+              <a:t>: </a:t>
             </a:r>
             <a:r>
               <a:rPr lang="en-US" b="0" dirty="0">
                 <a:effectLst/>
                 <a:latin typeface="Noto serif" panose="02020600060500020200" pitchFamily="18" charset="0"/>
               </a:rPr>
-              <a:t>: Utilizing knowledge from a source model might also help in fully learning the target task, as compared to a target model that learns from scratch. This, in turn, results in improvements in the overall time taken to develop and train a model.</a:t>
-            </a:r>
+              <a:t>Utilizing knowledge from a source model might also help in fully learning the target task, as compared to a target model that learns from scratch. This, in turn, results in improvements in the overall time taken to develop and train a model.  We have a </a:t>
+            </a:r>
+            <a:r>
+              <a:rPr lang="en-US" b="1" dirty="0">
+                <a:effectLst/>
+                <a:latin typeface="Noto serif" panose="02020600060500020200" pitchFamily="18" charset="0"/>
+              </a:rPr>
+              <a:t>higher slope.</a:t>
+            </a:r>
+            <a:endParaRPr lang="en-US" b="0" dirty="0">
+              <a:effectLst/>
+              <a:latin typeface="Noto serif" panose="02020600060500020200" pitchFamily="18" charset="0"/>
+            </a:endParaRPr>
           </a:p>
           <a:p>
             <a:pPr marL="685800" lvl="1" indent="-228600" algn="l">
               <a:buAutoNum type="arabicPeriod"/>
             </a:pPr>
             <a:r>
-              <a:rPr lang="en-US" b="1" i="0" dirty="0">
+              <a:rPr lang="en-US" b="1" i="1" dirty="0">
                 <a:effectLst/>
                 <a:latin typeface="Noto serif" panose="02020600060500020200" pitchFamily="18" charset="0"/>
               </a:rPr>
               <a:t>Improved final performance</a:t>
+            </a:r>
+            <a:r>
+              <a:rPr lang="en-US" b="0" i="1" dirty="0">
+                <a:effectLst/>
+                <a:latin typeface="Noto serif" panose="02020600060500020200" pitchFamily="18" charset="0"/>
+              </a:rPr>
+              <a:t>: </a:t>
             </a:r>
             <a:r>
               <a:rPr lang="en-US" b="0" dirty="0">
                 <a:effectLst/>
                 <a:latin typeface="Noto serif" panose="02020600060500020200" pitchFamily="18" charset="0"/>
               </a:rPr>
-              <a:t>: And finally, higher final performance might be attained by leveraging transfer learning.</a:t>
+              <a:t>And finally, higher final performance might be attained by leveraging transfer learning.  We have a </a:t>
+            </a:r>
+            <a:r>
+              <a:rPr lang="en-US" b="1" dirty="0">
+                <a:effectLst/>
+                <a:latin typeface="Noto serif" panose="02020600060500020200" pitchFamily="18" charset="0"/>
+              </a:rPr>
+              <a:t>higher asymptote</a:t>
+            </a:r>
+            <a:r>
+              <a:rPr lang="en-US" b="0" dirty="0">
+                <a:effectLst/>
+                <a:latin typeface="Noto serif" panose="02020600060500020200" pitchFamily="18" charset="0"/>
+              </a:rPr>
+              <a:t>.</a:t>
             </a:r>
           </a:p>
           <a:p>
@@ -2249,7 +2086,7 @@
               <a:rPr lang="en-US" dirty="0">
                 <a:latin typeface="+mn-lt"/>
               </a:rPr>
-              <a:t>Many types of transfer – don’t have time to cover here – please review the material in the handout</a:t>
+              <a:t>Many types of transfer learning – don’t have time to cover here – please review the material in the handout</a:t>
             </a:r>
           </a:p>
           <a:p>
@@ -2358,7 +2195,7 @@
               <a:rPr lang="en-US" sz="1800" b="0" i="0" u="none" strike="noStrike" baseline="0" dirty="0">
                 <a:latin typeface="PalatinoLinotype-Roman"/>
               </a:rPr>
-              <a:t>Before we start our first exercise, let’s take an initial look at the transfer learning process.  Deep learning systems are layered architectures that learn different features at different layers. These layers are then finally connected to a last layer (usually a fully connected layer, in the case of classification) to get the final output. This layered architecture allows us to utilize a pretrained network (such as Inception V3 or VGG) without its final layer as a fixed feature extractor for other tasks. </a:t>
+              <a:t>Before we do the exercises, let’s take an initial look at the transfer learning process.  Deep learning systems are layered architectures that learn different features at different layers. These layers are then finally connected to a last layer (usually a fully connected layer, in the case of classification) to get the final output. This layered architecture allows us to utilize a pretrained network (such as Inception V3 or VGG) without its final layer as a fixed feature extractor for other tasks. </a:t>
             </a:r>
             <a:endParaRPr lang="en-US" sz="1200" b="0" i="0" u="none" strike="noStrike" baseline="0" dirty="0">
               <a:latin typeface="+mj-lt"/>
@@ -2463,10 +2300,7 @@
               <a:tabLst/>
               <a:defRPr/>
             </a:pPr>
-            <a:r>
-              <a:rPr lang="en-US" dirty="0"/>
-              <a:t>Setup Instructions…</a:t>
-            </a:r>
+            <a:endParaRPr lang="en-US" dirty="0"/>
           </a:p>
         </p:txBody>
       </p:sp>
@@ -2487,7 +2321,7 @@
           <a:p>
             <a:fld id="{3148858F-F1DB-4027-9C85-CCA6849540DD}" type="slidenum">
               <a:rPr lang="en-US" smtClean="0"/>
-              <a:t>8</a:t>
+              <a:t>9</a:t>
             </a:fld>
             <a:endParaRPr lang="en-US"/>
           </a:p>
@@ -2496,7 +2330,7 @@
     </p:spTree>
     <p:extLst>
       <p:ext uri="{BB962C8B-B14F-4D97-AF65-F5344CB8AC3E}">
-        <p14:creationId xmlns:p14="http://schemas.microsoft.com/office/powerpoint/2010/main" val="1279646560"/>
+        <p14:creationId xmlns:p14="http://schemas.microsoft.com/office/powerpoint/2010/main" val="1985664105"/>
       </p:ext>
     </p:extLst>
   </p:cSld>
@@ -2550,6 +2384,113 @@
           <a:bodyPr/>
           <a:lstStyle/>
           <a:p>
+            <a:pPr algn="l"/>
+            <a:r>
+              <a:rPr lang="en-US" dirty="0"/>
+              <a:t>Let’s quickly review the basic ideas behind transfer learning:</a:t>
+            </a:r>
+          </a:p>
+          <a:p>
+            <a:pPr algn="l"/>
+            <a:endParaRPr lang="en-US" dirty="0"/>
+          </a:p>
+          <a:p>
+            <a:pPr marL="228600" indent="-228600" algn="l">
+              <a:buAutoNum type="alphaLcPeriod"/>
+            </a:pPr>
+            <a:r>
+              <a:rPr lang="en-US" dirty="0"/>
+              <a:t>It’s usually better to find and repurpose an existing model from a related domain rather than train a new neural network from scratch.</a:t>
+            </a:r>
+          </a:p>
+          <a:p>
+            <a:pPr marL="228600" indent="-228600" algn="l">
+              <a:buAutoNum type="alphaLcPeriod"/>
+            </a:pPr>
+            <a:r>
+              <a:rPr lang="en-US" dirty="0"/>
+              <a:t>Transfer learning not only decreases training time but also requires significantly less data.</a:t>
+            </a:r>
+          </a:p>
+          <a:p>
+            <a:pPr marL="228600" indent="-228600" algn="l">
+              <a:buAutoNum type="alphaLcPeriod"/>
+            </a:pPr>
+            <a:r>
+              <a:rPr lang="en-US" dirty="0"/>
+              <a:t>We typically retain the lower network layers (as shown here) and only replace just the top layers with new ones trained specifically for our task.</a:t>
+            </a:r>
+          </a:p>
+          <a:p>
+            <a:pPr marL="685800" marR="0" lvl="1" indent="-228600" algn="l" defTabSz="914400" rtl="0" eaLnBrk="1" fontAlgn="auto" latinLnBrk="0" hangingPunct="1">
+              <a:lnSpc>
+                <a:spcPct val="100000"/>
+              </a:lnSpc>
+              <a:spcBef>
+                <a:spcPts val="0"/>
+              </a:spcBef>
+              <a:spcAft>
+                <a:spcPts val="0"/>
+              </a:spcAft>
+              <a:buClrTx/>
+              <a:buSzTx/>
+              <a:buFontTx/>
+              <a:buAutoNum type="alphaLcPeriod"/>
+              <a:tabLst/>
+              <a:defRPr/>
+            </a:pPr>
+            <a:r>
+              <a:rPr lang="en-US" dirty="0"/>
+              <a:t>The original model’s output layer is usually replaced because it is most likely not useful for the new task.  For example, it may not even have the right number of outputs.  </a:t>
+            </a:r>
+          </a:p>
+          <a:p>
+            <a:pPr marL="685800" marR="0" lvl="1" indent="-228600" algn="l" defTabSz="914400" rtl="0" eaLnBrk="1" fontAlgn="auto" latinLnBrk="0" hangingPunct="1">
+              <a:lnSpc>
+                <a:spcPct val="100000"/>
+              </a:lnSpc>
+              <a:spcBef>
+                <a:spcPts val="0"/>
+              </a:spcBef>
+              <a:spcAft>
+                <a:spcPts val="0"/>
+              </a:spcAft>
+              <a:buClrTx/>
+              <a:buSzTx/>
+              <a:buFontTx/>
+              <a:buAutoNum type="alphaLcPeriod"/>
+              <a:tabLst/>
+              <a:defRPr/>
+            </a:pPr>
+            <a:r>
+              <a:rPr lang="en-US" dirty="0"/>
+              <a:t>Likewise, the original model’s upper hidden layers are less likely to be as useful as the lower ones, since the high-level features most suitable for the new task may differ significantly from the useful ones in the original task. </a:t>
+            </a:r>
+          </a:p>
+          <a:p>
+            <a:pPr marL="228600" marR="0" lvl="0" indent="-228600" algn="l" defTabSz="914400" rtl="0" eaLnBrk="1" fontAlgn="auto" latinLnBrk="0" hangingPunct="1">
+              <a:lnSpc>
+                <a:spcPct val="100000"/>
+              </a:lnSpc>
+              <a:spcBef>
+                <a:spcPts val="0"/>
+              </a:spcBef>
+              <a:spcAft>
+                <a:spcPts val="0"/>
+              </a:spcAft>
+              <a:buClrTx/>
+              <a:buSzTx/>
+              <a:buFontTx/>
+              <a:buAutoNum type="alphaLcPeriod"/>
+              <a:tabLst/>
+              <a:defRPr/>
+            </a:pPr>
+            <a:r>
+              <a:rPr lang="en-US" dirty="0"/>
+              <a:t>Transfer learning is an iterative process. Try freezing all the reused layers first (i.e., make their weights non-trainable so that Gradient Descent won’t modify them), then train your model and see how it performs. Then try unfreezing one or two of the top hidden layers to let backpropagation tweak them and see if performance improves. The more training data you have, the more layers you can unfreeze. It is also useful to reduce the learning rate when you unfreeze reused layers: this will avoid wrecking their fine-tuned weights.</a:t>
+            </a:r>
+          </a:p>
+          <a:p>
             <a:pPr marL="0" marR="0" lvl="0" indent="0" algn="l" defTabSz="914400" rtl="0" eaLnBrk="1" fontAlgn="auto" latinLnBrk="0" hangingPunct="1">
               <a:lnSpc>
                 <a:spcPct val="100000"/>
@@ -2569,6 +2510,66 @@
             </a:pPr>
             <a:endParaRPr lang="en-US" dirty="0"/>
           </a:p>
+          <a:p>
+            <a:pPr marL="0" indent="0" algn="l">
+              <a:buNone/>
+            </a:pPr>
+            <a:r>
+              <a:rPr lang="en-US" dirty="0"/>
+              <a:t>=====</a:t>
+            </a:r>
+          </a:p>
+          <a:p>
+            <a:pPr algn="l"/>
+            <a:r>
+              <a:rPr lang="en-US" dirty="0"/>
+              <a:t>It is generally not a good idea to train a very large DNN from scratch: instead, you should always try to find an existing neural network that accomplishes a similar task to the one you are trying to tackle, then reuse the lower layers of this network. If done well, transfer learning not only speeds up training considerably, but also requires significantly less training data.</a:t>
+            </a:r>
+          </a:p>
+          <a:p>
+            <a:pPr algn="l"/>
+            <a:endParaRPr lang="en-US" dirty="0"/>
+          </a:p>
+          <a:p>
+            <a:pPr algn="l"/>
+            <a:r>
+              <a:rPr lang="en-US" dirty="0"/>
+              <a:t>Suppose you have access to a DNN that was trained to classify pictures into 100 different categories, including animals, plants, vehicles, and everyday objects. You now want to train a DNN to classify specific types of vehicles. These tasks are very similar, even partly overlapping, so you should try to reuse parts of the first network as shown here.</a:t>
+            </a:r>
+          </a:p>
+          <a:p>
+            <a:pPr algn="l"/>
+            <a:endParaRPr lang="en-US" dirty="0"/>
+          </a:p>
+          <a:p>
+            <a:pPr algn="l"/>
+            <a:r>
+              <a:rPr lang="en-US" dirty="0"/>
+              <a:t>The output layer of the original model will usually be replaced because it is most likely not useful at all for the new task, and it may not even have the right number of outputs for the new task.  </a:t>
+            </a:r>
+          </a:p>
+          <a:p>
+            <a:pPr algn="l"/>
+            <a:endParaRPr lang="en-US" dirty="0"/>
+          </a:p>
+          <a:p>
+            <a:pPr algn="l"/>
+            <a:r>
+              <a:rPr lang="en-US" dirty="0"/>
+              <a:t>In like manner, the upper hidden layers of the original model are less likely to be as useful as the lower layers, since the high-level features that are most useful for the new task may differ significantly from the ones that were most useful for the original task. You want to find the right number of layers to reuse.</a:t>
+            </a:r>
+          </a:p>
+          <a:p>
+            <a:pPr algn="l"/>
+            <a:endParaRPr lang="en-US" dirty="0"/>
+          </a:p>
+          <a:p>
+            <a:pPr algn="l"/>
+            <a:r>
+              <a:rPr lang="en-US" dirty="0"/>
+              <a:t>Try freezing all the reused layers first (i.e., make their weights non-trainable so that Gradient Descent won’t modify them), then train your model and see how it performs. Then try unfreezing one or two of the top hidden layers to let backpropagation tweak them and see if performance improves. The more training data you have, the more layers you can unfreeze. It is also useful to reduce the learning rate when you unfreeze reused layers: this will avoid wrecking their fine-tuned weights.</a:t>
+            </a:r>
+          </a:p>
         </p:txBody>
       </p:sp>
       <p:sp>
@@ -2588,7 +2589,7 @@
           <a:p>
             <a:fld id="{3148858F-F1DB-4027-9C85-CCA6849540DD}" type="slidenum">
               <a:rPr lang="en-US" smtClean="0"/>
-              <a:t>9</a:t>
+              <a:t>10</a:t>
             </a:fld>
             <a:endParaRPr lang="en-US"/>
           </a:p>
@@ -2597,7 +2598,7 @@
     </p:spTree>
     <p:extLst>
       <p:ext uri="{BB962C8B-B14F-4D97-AF65-F5344CB8AC3E}">
-        <p14:creationId xmlns:p14="http://schemas.microsoft.com/office/powerpoint/2010/main" val="1985664105"/>
+        <p14:creationId xmlns:p14="http://schemas.microsoft.com/office/powerpoint/2010/main" val="3451864319"/>
       </p:ext>
     </p:extLst>
   </p:cSld>
@@ -2754,7 +2755,7 @@
           <a:p>
             <a:fld id="{C3F78080-8D0A-4BE8-A5B4-CB115102D524}" type="datetimeFigureOut">
               <a:rPr lang="en-US" smtClean="0"/>
-              <a:t>9/20/2022</a:t>
+              <a:t>10/11/2022</a:t>
             </a:fld>
             <a:endParaRPr lang="en-US"/>
           </a:p>
@@ -2952,7 +2953,7 @@
           <a:p>
             <a:fld id="{C3F78080-8D0A-4BE8-A5B4-CB115102D524}" type="datetimeFigureOut">
               <a:rPr lang="en-US" smtClean="0"/>
-              <a:t>9/20/2022</a:t>
+              <a:t>10/11/2022</a:t>
             </a:fld>
             <a:endParaRPr lang="en-US"/>
           </a:p>
@@ -3160,7 +3161,7 @@
           <a:p>
             <a:fld id="{C3F78080-8D0A-4BE8-A5B4-CB115102D524}" type="datetimeFigureOut">
               <a:rPr lang="en-US" smtClean="0"/>
-              <a:t>9/20/2022</a:t>
+              <a:t>10/11/2022</a:t>
             </a:fld>
             <a:endParaRPr lang="en-US"/>
           </a:p>
@@ -3358,7 +3359,7 @@
           <a:p>
             <a:fld id="{C3F78080-8D0A-4BE8-A5B4-CB115102D524}" type="datetimeFigureOut">
               <a:rPr lang="en-US" smtClean="0"/>
-              <a:t>9/20/2022</a:t>
+              <a:t>10/11/2022</a:t>
             </a:fld>
             <a:endParaRPr lang="en-US"/>
           </a:p>
@@ -3633,7 +3634,7 @@
           <a:p>
             <a:fld id="{C3F78080-8D0A-4BE8-A5B4-CB115102D524}" type="datetimeFigureOut">
               <a:rPr lang="en-US" smtClean="0"/>
-              <a:t>9/20/2022</a:t>
+              <a:t>10/11/2022</a:t>
             </a:fld>
             <a:endParaRPr lang="en-US"/>
           </a:p>
@@ -3898,7 +3899,7 @@
           <a:p>
             <a:fld id="{C3F78080-8D0A-4BE8-A5B4-CB115102D524}" type="datetimeFigureOut">
               <a:rPr lang="en-US" smtClean="0"/>
-              <a:t>9/20/2022</a:t>
+              <a:t>10/11/2022</a:t>
             </a:fld>
             <a:endParaRPr lang="en-US"/>
           </a:p>
@@ -4310,7 +4311,7 @@
           <a:p>
             <a:fld id="{C3F78080-8D0A-4BE8-A5B4-CB115102D524}" type="datetimeFigureOut">
               <a:rPr lang="en-US" smtClean="0"/>
-              <a:t>9/20/2022</a:t>
+              <a:t>10/11/2022</a:t>
             </a:fld>
             <a:endParaRPr lang="en-US"/>
           </a:p>
@@ -4451,7 +4452,7 @@
           <a:p>
             <a:fld id="{C3F78080-8D0A-4BE8-A5B4-CB115102D524}" type="datetimeFigureOut">
               <a:rPr lang="en-US" smtClean="0"/>
-              <a:t>9/20/2022</a:t>
+              <a:t>10/11/2022</a:t>
             </a:fld>
             <a:endParaRPr lang="en-US"/>
           </a:p>
@@ -4564,7 +4565,7 @@
           <a:p>
             <a:fld id="{C3F78080-8D0A-4BE8-A5B4-CB115102D524}" type="datetimeFigureOut">
               <a:rPr lang="en-US" smtClean="0"/>
-              <a:t>9/20/2022</a:t>
+              <a:t>10/11/2022</a:t>
             </a:fld>
             <a:endParaRPr lang="en-US"/>
           </a:p>
@@ -4875,7 +4876,7 @@
           <a:p>
             <a:fld id="{C3F78080-8D0A-4BE8-A5B4-CB115102D524}" type="datetimeFigureOut">
               <a:rPr lang="en-US" smtClean="0"/>
-              <a:t>9/20/2022</a:t>
+              <a:t>10/11/2022</a:t>
             </a:fld>
             <a:endParaRPr lang="en-US"/>
           </a:p>
@@ -5163,7 +5164,7 @@
           <a:p>
             <a:fld id="{C3F78080-8D0A-4BE8-A5B4-CB115102D524}" type="datetimeFigureOut">
               <a:rPr lang="en-US" smtClean="0"/>
-              <a:t>9/20/2022</a:t>
+              <a:t>10/11/2022</a:t>
             </a:fld>
             <a:endParaRPr lang="en-US"/>
           </a:p>
@@ -5404,7 +5405,7 @@
           <a:p>
             <a:fld id="{C3F78080-8D0A-4BE8-A5B4-CB115102D524}" type="datetimeFigureOut">
               <a:rPr lang="en-US" smtClean="0"/>
-              <a:t>9/20/2022</a:t>
+              <a:t>10/11/2022</a:t>
             </a:fld>
             <a:endParaRPr lang="en-US"/>
           </a:p>
@@ -7613,55 +7614,98 @@
       </p:grpSpPr>
       <p:pic>
         <p:nvPicPr>
-          <p:cNvPr id="1026" name="Picture 2" descr="Hugging Face: The Artificial Intelligence Community Building the Future">
-            <a:extLst>
-              <a:ext uri="{FF2B5EF4-FFF2-40B4-BE49-F238E27FC236}">
-                <a16:creationId xmlns:a16="http://schemas.microsoft.com/office/drawing/2014/main" id="{280E1861-D7F6-46FB-AFFE-3A33E6D35281}"/>
+          <p:cNvPr id="3" name="Picture 2">
+            <a:extLst>
+              <a:ext uri="{FF2B5EF4-FFF2-40B4-BE49-F238E27FC236}">
+                <a16:creationId xmlns:a16="http://schemas.microsoft.com/office/drawing/2014/main" id="{88CC7D4C-7D31-4E3C-92F7-200A7C7F587F}"/>
               </a:ext>
             </a:extLst>
           </p:cNvPr>
           <p:cNvPicPr>
-            <a:picLocks noChangeAspect="1" noChangeArrowheads="1"/>
+            <a:picLocks noChangeAspect="1"/>
           </p:cNvPicPr>
           <p:nvPr/>
         </p:nvPicPr>
         <p:blipFill>
-          <a:blip r:embed="rId3">
-            <a:extLst>
-              <a:ext uri="{28A0092B-C50C-407E-A947-70E740481C1C}">
-                <a14:useLocalDpi xmlns:a14="http://schemas.microsoft.com/office/drawing/2010/main" val="0"/>
-              </a:ext>
-            </a:extLst>
-          </a:blip>
-          <a:srcRect/>
+          <a:blip r:embed="rId3"/>
           <a:stretch>
             <a:fillRect/>
           </a:stretch>
         </p:blipFill>
-        <p:spPr bwMode="auto">
+        <p:spPr>
           <a:xfrm>
-            <a:off x="2119312" y="781050"/>
-            <a:ext cx="7953375" cy="5295900"/>
+            <a:off x="0" y="365760"/>
+            <a:ext cx="3233668" cy="805144"/>
+          </a:xfrm>
+          <a:prstGeom prst="rect">
+            <a:avLst/>
+          </a:prstGeom>
+        </p:spPr>
+      </p:pic>
+      <p:sp>
+        <p:nvSpPr>
+          <p:cNvPr id="4" name="TextBox 3">
+            <a:extLst>
+              <a:ext uri="{FF2B5EF4-FFF2-40B4-BE49-F238E27FC236}">
+                <a16:creationId xmlns:a16="http://schemas.microsoft.com/office/drawing/2014/main" id="{D80C2300-C072-4EDD-91B9-F3EBA464EDE2}"/>
+              </a:ext>
+            </a:extLst>
+          </p:cNvPr>
+          <p:cNvSpPr txBox="1"/>
+          <p:nvPr/>
+        </p:nvSpPr>
+        <p:spPr>
+          <a:xfrm>
+            <a:off x="0" y="3291840"/>
+            <a:ext cx="12192000" cy="1200329"/>
           </a:xfrm>
           <a:prstGeom prst="rect">
             <a:avLst/>
           </a:prstGeom>
           <a:noFill/>
-          <a:extLst>
-            <a:ext uri="{909E8E84-426E-40DD-AFC4-6F175D3DCCD1}">
-              <a14:hiddenFill xmlns:a14="http://schemas.microsoft.com/office/drawing/2010/main">
-                <a:solidFill>
-                  <a:srgbClr val="FFFFFF"/>
-                </a:solidFill>
-              </a14:hiddenFill>
-            </a:ext>
-          </a:extLst>
         </p:spPr>
-      </p:pic>
+        <p:txBody>
+          <a:bodyPr wrap="square" rtlCol="0">
+            <a:spAutoFit/>
+          </a:bodyPr>
+          <a:lstStyle/>
+          <a:p>
+            <a:pPr algn="ctr"/>
+            <a:r>
+              <a:rPr lang="en-US" sz="3600" dirty="0">
+                <a:solidFill>
+                  <a:schemeClr val="tx1">
+                    <a:lumMod val="65000"/>
+                    <a:lumOff val="35000"/>
+                  </a:schemeClr>
+                </a:solidFill>
+                <a:latin typeface="Palatino Linotype" panose="02040502050505030304" pitchFamily="18" charset="0"/>
+              </a:rPr>
+              <a:t>Transfer Learning (Fine Tuning)</a:t>
+            </a:r>
+          </a:p>
+          <a:p>
+            <a:pPr algn="ctr"/>
+            <a:r>
+              <a:rPr lang="en-US" sz="3600" dirty="0">
+                <a:solidFill>
+                  <a:schemeClr val="tx1">
+                    <a:lumMod val="65000"/>
+                    <a:lumOff val="35000"/>
+                  </a:schemeClr>
+                </a:solidFill>
+                <a:latin typeface="Palatino Linotype" panose="02040502050505030304" pitchFamily="18" charset="0"/>
+              </a:rPr>
+              <a:t>02.2_fine_tune.ipynb</a:t>
+            </a:r>
+            <a:endParaRPr lang="en-US" sz="3600" dirty="0"/>
+          </a:p>
+        </p:txBody>
+      </p:sp>
     </p:spTree>
     <p:extLst>
       <p:ext uri="{BB962C8B-B14F-4D97-AF65-F5344CB8AC3E}">
-        <p14:creationId xmlns:p14="http://schemas.microsoft.com/office/powerpoint/2010/main" val="3503339875"/>
+        <p14:creationId xmlns:p14="http://schemas.microsoft.com/office/powerpoint/2010/main" val="609489790"/>
       </p:ext>
     </p:extLst>
   </p:cSld>
@@ -7705,138 +7749,6 @@
           <p:cNvPr id="3" name="Picture 2">
             <a:extLst>
               <a:ext uri="{FF2B5EF4-FFF2-40B4-BE49-F238E27FC236}">
-                <a16:creationId xmlns:a16="http://schemas.microsoft.com/office/drawing/2014/main" id="{88CC7D4C-7D31-4E3C-92F7-200A7C7F587F}"/>
-              </a:ext>
-            </a:extLst>
-          </p:cNvPr>
-          <p:cNvPicPr>
-            <a:picLocks noChangeAspect="1"/>
-          </p:cNvPicPr>
-          <p:nvPr/>
-        </p:nvPicPr>
-        <p:blipFill>
-          <a:blip r:embed="rId3"/>
-          <a:stretch>
-            <a:fillRect/>
-          </a:stretch>
-        </p:blipFill>
-        <p:spPr>
-          <a:xfrm>
-            <a:off x="0" y="365760"/>
-            <a:ext cx="3233668" cy="805144"/>
-          </a:xfrm>
-          <a:prstGeom prst="rect">
-            <a:avLst/>
-          </a:prstGeom>
-        </p:spPr>
-      </p:pic>
-      <p:sp>
-        <p:nvSpPr>
-          <p:cNvPr id="4" name="TextBox 3">
-            <a:extLst>
-              <a:ext uri="{FF2B5EF4-FFF2-40B4-BE49-F238E27FC236}">
-                <a16:creationId xmlns:a16="http://schemas.microsoft.com/office/drawing/2014/main" id="{D80C2300-C072-4EDD-91B9-F3EBA464EDE2}"/>
-              </a:ext>
-            </a:extLst>
-          </p:cNvPr>
-          <p:cNvSpPr txBox="1"/>
-          <p:nvPr/>
-        </p:nvSpPr>
-        <p:spPr>
-          <a:xfrm>
-            <a:off x="0" y="3291840"/>
-            <a:ext cx="12192000" cy="1200329"/>
-          </a:xfrm>
-          <a:prstGeom prst="rect">
-            <a:avLst/>
-          </a:prstGeom>
-          <a:noFill/>
-        </p:spPr>
-        <p:txBody>
-          <a:bodyPr wrap="square" rtlCol="0">
-            <a:spAutoFit/>
-          </a:bodyPr>
-          <a:lstStyle/>
-          <a:p>
-            <a:pPr algn="ctr"/>
-            <a:r>
-              <a:rPr lang="en-US" sz="3600" dirty="0">
-                <a:solidFill>
-                  <a:schemeClr val="tx1">
-                    <a:lumMod val="65000"/>
-                    <a:lumOff val="35000"/>
-                  </a:schemeClr>
-                </a:solidFill>
-                <a:latin typeface="Palatino Linotype" panose="02040502050505030304" pitchFamily="18" charset="0"/>
-              </a:rPr>
-              <a:t>Transfer Learning (Fine Tuning)</a:t>
-            </a:r>
-          </a:p>
-          <a:p>
-            <a:pPr algn="ctr"/>
-            <a:r>
-              <a:rPr lang="en-US" sz="3600" dirty="0">
-                <a:solidFill>
-                  <a:schemeClr val="tx1">
-                    <a:lumMod val="65000"/>
-                    <a:lumOff val="35000"/>
-                  </a:schemeClr>
-                </a:solidFill>
-                <a:latin typeface="Palatino Linotype" panose="02040502050505030304" pitchFamily="18" charset="0"/>
-              </a:rPr>
-              <a:t>01.2_fine_tune.ipynb</a:t>
-            </a:r>
-            <a:endParaRPr lang="en-US" sz="3600" dirty="0"/>
-          </a:p>
-        </p:txBody>
-      </p:sp>
-    </p:spTree>
-    <p:extLst>
-      <p:ext uri="{BB962C8B-B14F-4D97-AF65-F5344CB8AC3E}">
-        <p14:creationId xmlns:p14="http://schemas.microsoft.com/office/powerpoint/2010/main" val="609489790"/>
-      </p:ext>
-    </p:extLst>
-  </p:cSld>
-  <p:clrMapOvr>
-    <a:masterClrMapping/>
-  </p:clrMapOvr>
-  <mc:AlternateContent xmlns:mc="http://schemas.openxmlformats.org/markup-compatibility/2006" xmlns:p14="http://schemas.microsoft.com/office/powerpoint/2010/main">
-    <mc:Choice Requires="p14">
-      <p:transition spd="med" p14:dur="700">
-        <p:fade/>
-      </p:transition>
-    </mc:Choice>
-    <mc:Fallback xmlns="">
-      <p:transition spd="med">
-        <p:fade/>
-      </p:transition>
-    </mc:Fallback>
-  </mc:AlternateContent>
-</p:sld>
-</file>
-
-<file path=ppt/slides/slide16.xml><?xml version="1.0" encoding="utf-8"?>
-<p:sld xmlns:a="http://schemas.openxmlformats.org/drawingml/2006/main" xmlns:r="http://schemas.openxmlformats.org/officeDocument/2006/relationships" xmlns:p="http://schemas.openxmlformats.org/presentationml/2006/main">
-  <p:cSld>
-    <p:spTree>
-      <p:nvGrpSpPr>
-        <p:cNvPr id="1" name=""/>
-        <p:cNvGrpSpPr/>
-        <p:nvPr/>
-      </p:nvGrpSpPr>
-      <p:grpSpPr>
-        <a:xfrm>
-          <a:off x="0" y="0"/>
-          <a:ext cx="0" cy="0"/>
-          <a:chOff x="0" y="0"/>
-          <a:chExt cx="0" cy="0"/>
-        </a:xfrm>
-      </p:grpSpPr>
-      <p:pic>
-        <p:nvPicPr>
-          <p:cNvPr id="3" name="Picture 2">
-            <a:extLst>
-              <a:ext uri="{FF2B5EF4-FFF2-40B4-BE49-F238E27FC236}">
                 <a16:creationId xmlns:a16="http://schemas.microsoft.com/office/drawing/2014/main" id="{239D0A82-7D34-4E48-BE20-B982B3990537}"/>
               </a:ext>
             </a:extLst>
@@ -7916,7 +7828,7 @@
                 </a:solidFill>
                 <a:latin typeface="Palatino Linotype" panose="02040502050505030304" pitchFamily="18" charset="0"/>
               </a:rPr>
-              <a:t>01.3_fruit_class.ipynb</a:t>
+              <a:t>02.3_fruit_class.ipynb</a:t>
             </a:r>
             <a:endParaRPr lang="en-US" sz="3600" dirty="0"/>
           </a:p>
@@ -7947,7 +7859,7 @@
 </p:sld>
 </file>
 
-<file path=ppt/slides/slide17.xml><?xml version="1.0" encoding="utf-8"?>
+<file path=ppt/slides/slide16.xml><?xml version="1.0" encoding="utf-8"?>
 <p:sld xmlns:a="http://schemas.openxmlformats.org/drawingml/2006/main" xmlns:r="http://schemas.openxmlformats.org/officeDocument/2006/relationships" xmlns:p="http://schemas.openxmlformats.org/presentationml/2006/main">
   <p:cSld>
     <p:spTree>
@@ -7989,7 +7901,7 @@
 </p:sld>
 </file>
 
-<file path=ppt/slides/slide18.xml><?xml version="1.0" encoding="utf-8"?>
+<file path=ppt/slides/slide17.xml><?xml version="1.0" encoding="utf-8"?>
 <p:sld xmlns:a="http://schemas.openxmlformats.org/drawingml/2006/main" xmlns:r="http://schemas.openxmlformats.org/officeDocument/2006/relationships" xmlns:p="http://schemas.openxmlformats.org/presentationml/2006/main">
   <p:cSld>
     <p:spTree>
@@ -9446,75 +9358,74 @@
           <a:chExt cx="0" cy="0"/>
         </a:xfrm>
       </p:grpSpPr>
-      <p:pic>
-        <p:nvPicPr>
-          <p:cNvPr id="1026" name="Picture 2" descr="Project Jupyter - Wikipedia">
-            <a:extLst>
-              <a:ext uri="{FF2B5EF4-FFF2-40B4-BE49-F238E27FC236}">
-                <a16:creationId xmlns:a16="http://schemas.microsoft.com/office/drawing/2014/main" id="{2E199D10-634D-4257-BA3C-C6BFAF6D0A76}"/>
-              </a:ext>
-            </a:extLst>
-          </p:cNvPr>
-          <p:cNvPicPr>
-            <a:picLocks noChangeAspect="1" noChangeArrowheads="1"/>
-          </p:cNvPicPr>
+      <p:sp>
+        <p:nvSpPr>
+          <p:cNvPr id="3" name="TextBox 2">
+            <a:extLst>
+              <a:ext uri="{FF2B5EF4-FFF2-40B4-BE49-F238E27FC236}">
+                <a16:creationId xmlns:a16="http://schemas.microsoft.com/office/drawing/2014/main" id="{558F3CCB-26C2-2079-ED9F-F97D33863C15}"/>
+              </a:ext>
+            </a:extLst>
+          </p:cNvPr>
+          <p:cNvSpPr txBox="1"/>
           <p:nvPr/>
-        </p:nvPicPr>
-        <p:blipFill>
-          <a:blip r:embed="rId3">
-            <a:extLst>
-              <a:ext uri="{28A0092B-C50C-407E-A947-70E740481C1C}">
-                <a14:useLocalDpi xmlns:a14="http://schemas.microsoft.com/office/drawing/2010/main" val="0"/>
-              </a:ext>
-            </a:extLst>
-          </a:blip>
-          <a:srcRect/>
-          <a:stretch>
-            <a:fillRect/>
-          </a:stretch>
-        </p:blipFill>
-        <p:spPr bwMode="auto">
+        </p:nvSpPr>
+        <p:spPr>
           <a:xfrm>
-            <a:off x="4581999" y="1674108"/>
-            <a:ext cx="3028001" cy="3509783"/>
+            <a:off x="0" y="2828835"/>
+            <a:ext cx="12192000" cy="1323439"/>
           </a:xfrm>
           <a:prstGeom prst="rect">
             <a:avLst/>
           </a:prstGeom>
           <a:noFill/>
-          <a:extLst>
-            <a:ext uri="{909E8E84-426E-40DD-AFC4-6F175D3DCCD1}">
-              <a14:hiddenFill xmlns:a14="http://schemas.microsoft.com/office/drawing/2010/main">
-                <a:solidFill>
-                  <a:srgbClr val="FFFFFF"/>
-                </a:solidFill>
-              </a14:hiddenFill>
-            </a:ext>
-          </a:extLst>
         </p:spPr>
-      </p:pic>
+        <p:txBody>
+          <a:bodyPr wrap="square" rtlCol="0">
+            <a:spAutoFit/>
+          </a:bodyPr>
+          <a:lstStyle/>
+          <a:p>
+            <a:pPr algn="ctr"/>
+            <a:r>
+              <a:rPr lang="en-US" sz="4400" dirty="0">
+                <a:solidFill>
+                  <a:srgbClr val="54D61E"/>
+                </a:solidFill>
+                <a:latin typeface="Courier New" panose="02070309020205020404" pitchFamily="49" charset="0"/>
+                <a:cs typeface="Courier New" panose="02070309020205020404" pitchFamily="49" charset="0"/>
+              </a:rPr>
+              <a:t>Talk and Doc</a:t>
+            </a:r>
+          </a:p>
+          <a:p>
+            <a:pPr algn="ctr"/>
+            <a:r>
+              <a:rPr lang="en-US" sz="3600" dirty="0">
+                <a:solidFill>
+                  <a:schemeClr val="tx1">
+                    <a:lumMod val="65000"/>
+                    <a:lumOff val="35000"/>
+                  </a:schemeClr>
+                </a:solidFill>
+                <a:latin typeface="Palatino Linotype" panose="02040502050505030304" pitchFamily="18" charset="0"/>
+              </a:rPr>
+              <a:t>02.0_transfer_hot_dog.ipynb</a:t>
+            </a:r>
+            <a:endParaRPr lang="en-US" sz="3600" dirty="0"/>
+          </a:p>
+        </p:txBody>
+      </p:sp>
     </p:spTree>
     <p:extLst>
       <p:ext uri="{BB962C8B-B14F-4D97-AF65-F5344CB8AC3E}">
-        <p14:creationId xmlns:p14="http://schemas.microsoft.com/office/powerpoint/2010/main" val="2383651979"/>
+        <p14:creationId xmlns:p14="http://schemas.microsoft.com/office/powerpoint/2010/main" val="4013088514"/>
       </p:ext>
     </p:extLst>
   </p:cSld>
   <p:clrMapOvr>
     <a:masterClrMapping/>
   </p:clrMapOvr>
-  <mc:AlternateContent xmlns:mc="http://schemas.openxmlformats.org/markup-compatibility/2006" xmlns:p14="http://schemas.microsoft.com/office/powerpoint/2010/main">
-    <mc:Choice Requires="p14">
-      <p:transition spd="med" p14:dur="700">
-        <p:fade/>
-      </p:transition>
-    </mc:Choice>
-    <mc:Fallback xmlns="">
-      <p:transition spd="med">
-        <p:fade/>
-      </p:transition>
-    </mc:Fallback>
-  </mc:AlternateContent>
 </p:sld>
 </file>
 
@@ -9619,7 +9530,7 @@
                 </a:solidFill>
                 <a:latin typeface="Palatino Linotype" panose="02040502050505030304" pitchFamily="18" charset="0"/>
               </a:rPr>
-              <a:t>01.1_transfer.ipynb</a:t>
+              <a:t>02.1_transfer.ipynb</a:t>
             </a:r>
             <a:endParaRPr lang="en-US" sz="3600" dirty="0"/>
           </a:p>

</xml_diff>

<commit_message>
Minor updates to transfer learn presentation.
</commit_message>
<xml_diff>
--- a/presentations/02_transfer_learn.pptx
+++ b/presentations/02_transfer_learn.pptx
@@ -5,7 +5,7 @@
     <p:sldMasterId id="2147483648" r:id="rId1"/>
   </p:sldMasterIdLst>
   <p:notesMasterIdLst>
-    <p:notesMasterId r:id="rId19"/>
+    <p:notesMasterId r:id="rId17"/>
   </p:notesMasterIdLst>
   <p:sldIdLst>
     <p:sldId id="326" r:id="rId2"/>
@@ -23,8 +23,6 @@
     <p:sldId id="333" r:id="rId14"/>
     <p:sldId id="341" r:id="rId15"/>
     <p:sldId id="345" r:id="rId16"/>
-    <p:sldId id="335" r:id="rId17"/>
-    <p:sldId id="346" r:id="rId18"/>
   </p:sldIdLst>
   <p:sldSz cx="12192000" cy="6858000"/>
   <p:notesSz cx="6858000" cy="9144000"/>
@@ -1415,184 +1413,6 @@
     <p:extLst>
       <p:ext uri="{BB962C8B-B14F-4D97-AF65-F5344CB8AC3E}">
         <p14:creationId xmlns:p14="http://schemas.microsoft.com/office/powerpoint/2010/main" val="1974960137"/>
-      </p:ext>
-    </p:extLst>
-  </p:cSld>
-  <p:clrMapOvr>
-    <a:masterClrMapping/>
-  </p:clrMapOvr>
-</p:notes>
-</file>
-
-<file path=ppt/notesSlides/notesSlide16.xml><?xml version="1.0" encoding="utf-8"?>
-<p:notes xmlns:a="http://schemas.openxmlformats.org/drawingml/2006/main" xmlns:r="http://schemas.openxmlformats.org/officeDocument/2006/relationships" xmlns:p="http://schemas.openxmlformats.org/presentationml/2006/main">
-  <p:cSld>
-    <p:spTree>
-      <p:nvGrpSpPr>
-        <p:cNvPr id="1" name=""/>
-        <p:cNvGrpSpPr/>
-        <p:nvPr/>
-      </p:nvGrpSpPr>
-      <p:grpSpPr>
-        <a:xfrm>
-          <a:off x="0" y="0"/>
-          <a:ext cx="0" cy="0"/>
-          <a:chOff x="0" y="0"/>
-          <a:chExt cx="0" cy="0"/>
-        </a:xfrm>
-      </p:grpSpPr>
-      <p:sp>
-        <p:nvSpPr>
-          <p:cNvPr id="2" name="Slide Image Placeholder 1"/>
-          <p:cNvSpPr>
-            <a:spLocks noGrp="1" noRot="1" noChangeAspect="1"/>
-          </p:cNvSpPr>
-          <p:nvPr>
-            <p:ph type="sldImg"/>
-          </p:nvPr>
-        </p:nvSpPr>
-        <p:spPr/>
-      </p:sp>
-      <p:sp>
-        <p:nvSpPr>
-          <p:cNvPr id="3" name="Notes Placeholder 2"/>
-          <p:cNvSpPr>
-            <a:spLocks noGrp="1"/>
-          </p:cNvSpPr>
-          <p:nvPr>
-            <p:ph type="body" idx="1"/>
-          </p:nvPr>
-        </p:nvSpPr>
-        <p:spPr/>
-        <p:txBody>
-          <a:bodyPr/>
-          <a:lstStyle/>
-          <a:p>
-            <a:pPr marL="0" indent="0" algn="l">
-              <a:buNone/>
-            </a:pPr>
-            <a:endParaRPr lang="en-US" dirty="0"/>
-          </a:p>
-        </p:txBody>
-      </p:sp>
-      <p:sp>
-        <p:nvSpPr>
-          <p:cNvPr id="4" name="Slide Number Placeholder 3"/>
-          <p:cNvSpPr>
-            <a:spLocks noGrp="1"/>
-          </p:cNvSpPr>
-          <p:nvPr>
-            <p:ph type="sldNum" sz="quarter" idx="5"/>
-          </p:nvPr>
-        </p:nvSpPr>
-        <p:spPr/>
-        <p:txBody>
-          <a:bodyPr/>
-          <a:lstStyle/>
-          <a:p>
-            <a:fld id="{3148858F-F1DB-4027-9C85-CCA6849540DD}" type="slidenum">
-              <a:rPr lang="en-US" smtClean="0"/>
-              <a:t>16</a:t>
-            </a:fld>
-            <a:endParaRPr lang="en-US"/>
-          </a:p>
-        </p:txBody>
-      </p:sp>
-    </p:spTree>
-    <p:extLst>
-      <p:ext uri="{BB962C8B-B14F-4D97-AF65-F5344CB8AC3E}">
-        <p14:creationId xmlns:p14="http://schemas.microsoft.com/office/powerpoint/2010/main" val="108490749"/>
-      </p:ext>
-    </p:extLst>
-  </p:cSld>
-  <p:clrMapOvr>
-    <a:masterClrMapping/>
-  </p:clrMapOvr>
-</p:notes>
-</file>
-
-<file path=ppt/notesSlides/notesSlide17.xml><?xml version="1.0" encoding="utf-8"?>
-<p:notes xmlns:a="http://schemas.openxmlformats.org/drawingml/2006/main" xmlns:r="http://schemas.openxmlformats.org/officeDocument/2006/relationships" xmlns:p="http://schemas.openxmlformats.org/presentationml/2006/main">
-  <p:cSld>
-    <p:spTree>
-      <p:nvGrpSpPr>
-        <p:cNvPr id="1" name=""/>
-        <p:cNvGrpSpPr/>
-        <p:nvPr/>
-      </p:nvGrpSpPr>
-      <p:grpSpPr>
-        <a:xfrm>
-          <a:off x="0" y="0"/>
-          <a:ext cx="0" cy="0"/>
-          <a:chOff x="0" y="0"/>
-          <a:chExt cx="0" cy="0"/>
-        </a:xfrm>
-      </p:grpSpPr>
-      <p:sp>
-        <p:nvSpPr>
-          <p:cNvPr id="2" name="Slide Image Placeholder 1"/>
-          <p:cNvSpPr>
-            <a:spLocks noGrp="1" noRot="1" noChangeAspect="1"/>
-          </p:cNvSpPr>
-          <p:nvPr>
-            <p:ph type="sldImg"/>
-          </p:nvPr>
-        </p:nvSpPr>
-        <p:spPr/>
-      </p:sp>
-      <p:sp>
-        <p:nvSpPr>
-          <p:cNvPr id="3" name="Notes Placeholder 2"/>
-          <p:cNvSpPr>
-            <a:spLocks noGrp="1"/>
-          </p:cNvSpPr>
-          <p:nvPr>
-            <p:ph type="body" idx="1"/>
-          </p:nvPr>
-        </p:nvSpPr>
-        <p:spPr/>
-        <p:txBody>
-          <a:bodyPr/>
-          <a:lstStyle/>
-          <a:p>
-            <a:endParaRPr lang="en-US" dirty="0">
-              <a:latin typeface="Palatino Linotype" panose="02040502050505030304" pitchFamily="18" charset="0"/>
-            </a:endParaRPr>
-          </a:p>
-          <a:p>
-            <a:endParaRPr lang="en-US" dirty="0">
-              <a:latin typeface="Palatino Linotype" panose="02040502050505030304" pitchFamily="18" charset="0"/>
-            </a:endParaRPr>
-          </a:p>
-        </p:txBody>
-      </p:sp>
-      <p:sp>
-        <p:nvSpPr>
-          <p:cNvPr id="4" name="Slide Number Placeholder 3"/>
-          <p:cNvSpPr>
-            <a:spLocks noGrp="1"/>
-          </p:cNvSpPr>
-          <p:nvPr>
-            <p:ph type="sldNum" sz="quarter" idx="5"/>
-          </p:nvPr>
-        </p:nvSpPr>
-        <p:spPr/>
-        <p:txBody>
-          <a:bodyPr/>
-          <a:lstStyle/>
-          <a:p>
-            <a:fld id="{3148858F-F1DB-4027-9C85-CCA6849540DD}" type="slidenum">
-              <a:rPr lang="en-US" smtClean="0"/>
-              <a:t>17</a:t>
-            </a:fld>
-            <a:endParaRPr lang="en-US"/>
-          </a:p>
-        </p:txBody>
-      </p:sp>
-    </p:spTree>
-    <p:extLst>
-      <p:ext uri="{BB962C8B-B14F-4D97-AF65-F5344CB8AC3E}">
-        <p14:creationId xmlns:p14="http://schemas.microsoft.com/office/powerpoint/2010/main" val="2023840696"/>
       </p:ext>
     </p:extLst>
   </p:cSld>
@@ -7459,7 +7279,7 @@
         <p:spPr>
           <a:xfrm>
             <a:off x="2448019" y="1416210"/>
-            <a:ext cx="1504708" cy="369332"/>
+            <a:ext cx="1504708" cy="400110"/>
           </a:xfrm>
           <a:prstGeom prst="rect">
             <a:avLst/>
@@ -7474,7 +7294,7 @@
           <a:p>
             <a:pPr algn="ctr"/>
             <a:r>
-              <a:rPr lang="en-US" dirty="0">
+              <a:rPr lang="en-US" sz="2000" dirty="0">
                 <a:solidFill>
                   <a:schemeClr val="bg1"/>
                 </a:solidFill>
@@ -7553,7 +7373,7 @@
         </p:nvSpPr>
         <p:spPr>
           <a:xfrm>
-            <a:off x="2448019" y="677711"/>
+            <a:off x="2448019" y="622626"/>
             <a:ext cx="1504708" cy="400110"/>
           </a:xfrm>
           <a:prstGeom prst="rect">
@@ -10411,170 +10231,6 @@
     <p:extLst>
       <p:ext uri="{BB962C8B-B14F-4D97-AF65-F5344CB8AC3E}">
         <p14:creationId xmlns:p14="http://schemas.microsoft.com/office/powerpoint/2010/main" val="994788979"/>
-      </p:ext>
-    </p:extLst>
-  </p:cSld>
-  <p:clrMapOvr>
-    <a:masterClrMapping/>
-  </p:clrMapOvr>
-  <mc:AlternateContent xmlns:mc="http://schemas.openxmlformats.org/markup-compatibility/2006" xmlns:p14="http://schemas.microsoft.com/office/powerpoint/2010/main">
-    <mc:Choice Requires="p14">
-      <p:transition spd="med" p14:dur="700">
-        <p:fade/>
-      </p:transition>
-    </mc:Choice>
-    <mc:Fallback xmlns="">
-      <p:transition spd="med">
-        <p:fade/>
-      </p:transition>
-    </mc:Fallback>
-  </mc:AlternateContent>
-</p:sld>
-</file>
-
-<file path=ppt/slides/slide16.xml><?xml version="1.0" encoding="utf-8"?>
-<p:sld xmlns:a="http://schemas.openxmlformats.org/drawingml/2006/main" xmlns:r="http://schemas.openxmlformats.org/officeDocument/2006/relationships" xmlns:p="http://schemas.openxmlformats.org/presentationml/2006/main">
-  <p:cSld>
-    <p:spTree>
-      <p:nvGrpSpPr>
-        <p:cNvPr id="1" name=""/>
-        <p:cNvGrpSpPr/>
-        <p:nvPr/>
-      </p:nvGrpSpPr>
-      <p:grpSpPr>
-        <a:xfrm>
-          <a:off x="0" y="0"/>
-          <a:ext cx="0" cy="0"/>
-          <a:chOff x="0" y="0"/>
-          <a:chExt cx="0" cy="0"/>
-        </a:xfrm>
-      </p:grpSpPr>
-    </p:spTree>
-    <p:extLst>
-      <p:ext uri="{BB962C8B-B14F-4D97-AF65-F5344CB8AC3E}">
-        <p14:creationId xmlns:p14="http://schemas.microsoft.com/office/powerpoint/2010/main" val="2165812169"/>
-      </p:ext>
-    </p:extLst>
-  </p:cSld>
-  <p:clrMapOvr>
-    <a:masterClrMapping/>
-  </p:clrMapOvr>
-  <mc:AlternateContent xmlns:mc="http://schemas.openxmlformats.org/markup-compatibility/2006" xmlns:p14="http://schemas.microsoft.com/office/powerpoint/2010/main">
-    <mc:Choice Requires="p14">
-      <p:transition spd="med" p14:dur="700">
-        <p:fade/>
-      </p:transition>
-    </mc:Choice>
-    <mc:Fallback xmlns="">
-      <p:transition spd="med">
-        <p:fade/>
-      </p:transition>
-    </mc:Fallback>
-  </mc:AlternateContent>
-</p:sld>
-</file>
-
-<file path=ppt/slides/slide17.xml><?xml version="1.0" encoding="utf-8"?>
-<p:sld xmlns:a="http://schemas.openxmlformats.org/drawingml/2006/main" xmlns:r="http://schemas.openxmlformats.org/officeDocument/2006/relationships" xmlns:p="http://schemas.openxmlformats.org/presentationml/2006/main">
-  <p:cSld>
-    <p:spTree>
-      <p:nvGrpSpPr>
-        <p:cNvPr id="1" name=""/>
-        <p:cNvGrpSpPr/>
-        <p:nvPr/>
-      </p:nvGrpSpPr>
-      <p:grpSpPr>
-        <a:xfrm>
-          <a:off x="0" y="0"/>
-          <a:ext cx="0" cy="0"/>
-          <a:chOff x="0" y="0"/>
-          <a:chExt cx="0" cy="0"/>
-        </a:xfrm>
-      </p:grpSpPr>
-      <p:sp>
-        <p:nvSpPr>
-          <p:cNvPr id="11" name="TextBox 10">
-            <a:extLst>
-              <a:ext uri="{FF2B5EF4-FFF2-40B4-BE49-F238E27FC236}">
-                <a16:creationId xmlns:a16="http://schemas.microsoft.com/office/drawing/2014/main" id="{032EA95D-BE72-4FC1-87D5-1F0489EE2C7E}"/>
-              </a:ext>
-            </a:extLst>
-          </p:cNvPr>
-          <p:cNvSpPr txBox="1"/>
-          <p:nvPr/>
-        </p:nvSpPr>
-        <p:spPr>
-          <a:xfrm>
-            <a:off x="11430" y="6550223"/>
-            <a:ext cx="12192000" cy="307777"/>
-          </a:xfrm>
-          <a:prstGeom prst="rect">
-            <a:avLst/>
-          </a:prstGeom>
-          <a:noFill/>
-        </p:spPr>
-        <p:txBody>
-          <a:bodyPr wrap="square" rtlCol="0">
-            <a:spAutoFit/>
-          </a:bodyPr>
-          <a:lstStyle/>
-          <a:p>
-            <a:r>
-              <a:rPr lang="en-US" sz="1400" dirty="0">
-                <a:solidFill>
-                  <a:schemeClr val="tx1">
-                    <a:lumMod val="65000"/>
-                    <a:lumOff val="35000"/>
-                  </a:schemeClr>
-                </a:solidFill>
-                <a:latin typeface="+mj-lt"/>
-                <a:ea typeface="Verdana" panose="020B0604030504040204" pitchFamily="34" charset="0"/>
-              </a:rPr>
-              <a:t>Image Credit: https://cktechcheck.com/</a:t>
-            </a:r>
-          </a:p>
-        </p:txBody>
-      </p:sp>
-      <p:pic>
-        <p:nvPicPr>
-          <p:cNvPr id="3" name="Picture 2" descr="A green and white logo&#10;&#10;Description automatically generated with low confidence">
-            <a:extLst>
-              <a:ext uri="{FF2B5EF4-FFF2-40B4-BE49-F238E27FC236}">
-                <a16:creationId xmlns:a16="http://schemas.microsoft.com/office/drawing/2014/main" id="{845735AC-AF18-4257-A9FE-DE0BE6D668A3}"/>
-              </a:ext>
-            </a:extLst>
-          </p:cNvPr>
-          <p:cNvPicPr>
-            <a:picLocks noChangeAspect="1"/>
-          </p:cNvPicPr>
-          <p:nvPr/>
-        </p:nvPicPr>
-        <p:blipFill>
-          <a:blip r:embed="rId3">
-            <a:extLst>
-              <a:ext uri="{28A0092B-C50C-407E-A947-70E740481C1C}">
-                <a14:useLocalDpi xmlns:a14="http://schemas.microsoft.com/office/drawing/2010/main" val="0"/>
-              </a:ext>
-            </a:extLst>
-          </a:blip>
-          <a:stretch>
-            <a:fillRect/>
-          </a:stretch>
-        </p:blipFill>
-        <p:spPr>
-          <a:xfrm>
-            <a:off x="2347157" y="2219696"/>
-            <a:ext cx="7497685" cy="2418608"/>
-          </a:xfrm>
-          <a:prstGeom prst="rect">
-            <a:avLst/>
-          </a:prstGeom>
-        </p:spPr>
-      </p:pic>
-    </p:spTree>
-    <p:extLst>
-      <p:ext uri="{BB962C8B-B14F-4D97-AF65-F5344CB8AC3E}">
-        <p14:creationId xmlns:p14="http://schemas.microsoft.com/office/powerpoint/2010/main" val="264863391"/>
       </p:ext>
     </p:extLst>
   </p:cSld>
@@ -14989,6 +14645,12 @@
             <a:pPr algn="ctr"/>
             <a:r>
               <a:rPr lang="en-US" sz="3600" b="1" dirty="0">
+                <a:solidFill>
+                  <a:schemeClr val="tx1">
+                    <a:lumMod val="75000"/>
+                    <a:lumOff val="25000"/>
+                  </a:schemeClr>
+                </a:solidFill>
                 <a:latin typeface="Avenir Black" panose="02000503020000020003" pitchFamily="2" charset="0"/>
                 <a:cs typeface="Arial" panose="020B0604020202020204" pitchFamily="34" charset="0"/>
               </a:rPr>

</xml_diff>

<commit_message>
Updated 02_transfer_learn.pptx to new look-and-feel.
</commit_message>
<xml_diff>
--- a/presentations/02_transfer_learn.pptx
+++ b/presentations/02_transfer_learn.pptx
@@ -224,7 +224,7 @@
           <a:p>
             <a:fld id="{FD93C9B2-20F6-4DB1-B471-224337D0AC79}" type="datetimeFigureOut">
               <a:rPr lang="en-US" smtClean="0"/>
-              <a:t>11/14/2022</a:t>
+              <a:t>11/18/2022</a:t>
             </a:fld>
             <a:endParaRPr lang="en-US"/>
           </a:p>
@@ -2763,7 +2763,7 @@
           <a:p>
             <a:fld id="{C3F78080-8D0A-4BE8-A5B4-CB115102D524}" type="datetimeFigureOut">
               <a:rPr lang="en-US" smtClean="0"/>
-              <a:t>11/14/2022</a:t>
+              <a:t>11/18/2022</a:t>
             </a:fld>
             <a:endParaRPr lang="en-US"/>
           </a:p>
@@ -2961,7 +2961,7 @@
           <a:p>
             <a:fld id="{C3F78080-8D0A-4BE8-A5B4-CB115102D524}" type="datetimeFigureOut">
               <a:rPr lang="en-US" smtClean="0"/>
-              <a:t>11/14/2022</a:t>
+              <a:t>11/18/2022</a:t>
             </a:fld>
             <a:endParaRPr lang="en-US"/>
           </a:p>
@@ -3169,7 +3169,7 @@
           <a:p>
             <a:fld id="{C3F78080-8D0A-4BE8-A5B4-CB115102D524}" type="datetimeFigureOut">
               <a:rPr lang="en-US" smtClean="0"/>
-              <a:t>11/14/2022</a:t>
+              <a:t>11/18/2022</a:t>
             </a:fld>
             <a:endParaRPr lang="en-US"/>
           </a:p>
@@ -3367,7 +3367,7 @@
           <a:p>
             <a:fld id="{C3F78080-8D0A-4BE8-A5B4-CB115102D524}" type="datetimeFigureOut">
               <a:rPr lang="en-US" smtClean="0"/>
-              <a:t>11/14/2022</a:t>
+              <a:t>11/18/2022</a:t>
             </a:fld>
             <a:endParaRPr lang="en-US"/>
           </a:p>
@@ -3642,7 +3642,7 @@
           <a:p>
             <a:fld id="{C3F78080-8D0A-4BE8-A5B4-CB115102D524}" type="datetimeFigureOut">
               <a:rPr lang="en-US" smtClean="0"/>
-              <a:t>11/14/2022</a:t>
+              <a:t>11/18/2022</a:t>
             </a:fld>
             <a:endParaRPr lang="en-US"/>
           </a:p>
@@ -3907,7 +3907,7 @@
           <a:p>
             <a:fld id="{C3F78080-8D0A-4BE8-A5B4-CB115102D524}" type="datetimeFigureOut">
               <a:rPr lang="en-US" smtClean="0"/>
-              <a:t>11/14/2022</a:t>
+              <a:t>11/18/2022</a:t>
             </a:fld>
             <a:endParaRPr lang="en-US"/>
           </a:p>
@@ -4319,7 +4319,7 @@
           <a:p>
             <a:fld id="{C3F78080-8D0A-4BE8-A5B4-CB115102D524}" type="datetimeFigureOut">
               <a:rPr lang="en-US" smtClean="0"/>
-              <a:t>11/14/2022</a:t>
+              <a:t>11/18/2022</a:t>
             </a:fld>
             <a:endParaRPr lang="en-US"/>
           </a:p>
@@ -4460,7 +4460,7 @@
           <a:p>
             <a:fld id="{C3F78080-8D0A-4BE8-A5B4-CB115102D524}" type="datetimeFigureOut">
               <a:rPr lang="en-US" smtClean="0"/>
-              <a:t>11/14/2022</a:t>
+              <a:t>11/18/2022</a:t>
             </a:fld>
             <a:endParaRPr lang="en-US"/>
           </a:p>
@@ -4573,7 +4573,7 @@
           <a:p>
             <a:fld id="{C3F78080-8D0A-4BE8-A5B4-CB115102D524}" type="datetimeFigureOut">
               <a:rPr lang="en-US" smtClean="0"/>
-              <a:t>11/14/2022</a:t>
+              <a:t>11/18/2022</a:t>
             </a:fld>
             <a:endParaRPr lang="en-US"/>
           </a:p>
@@ -4884,7 +4884,7 @@
           <a:p>
             <a:fld id="{C3F78080-8D0A-4BE8-A5B4-CB115102D524}" type="datetimeFigureOut">
               <a:rPr lang="en-US" smtClean="0"/>
-              <a:t>11/14/2022</a:t>
+              <a:t>11/18/2022</a:t>
             </a:fld>
             <a:endParaRPr lang="en-US"/>
           </a:p>
@@ -5172,7 +5172,7 @@
           <a:p>
             <a:fld id="{C3F78080-8D0A-4BE8-A5B4-CB115102D524}" type="datetimeFigureOut">
               <a:rPr lang="en-US" smtClean="0"/>
-              <a:t>11/14/2022</a:t>
+              <a:t>11/18/2022</a:t>
             </a:fld>
             <a:endParaRPr lang="en-US"/>
           </a:p>
@@ -5413,7 +5413,7 @@
           <a:p>
             <a:fld id="{C3F78080-8D0A-4BE8-A5B4-CB115102D524}" type="datetimeFigureOut">
               <a:rPr lang="en-US" smtClean="0"/>
-              <a:t>11/14/2022</a:t>
+              <a:t>11/18/2022</a:t>
             </a:fld>
             <a:endParaRPr lang="en-US"/>
           </a:p>
@@ -10149,124 +10149,103 @@
           </a:p>
         </p:txBody>
       </p:sp>
-      <p:grpSp>
-        <p:nvGrpSpPr>
-          <p:cNvPr id="3" name="Group 2">
-            <a:extLst>
-              <a:ext uri="{FF2B5EF4-FFF2-40B4-BE49-F238E27FC236}">
-                <a16:creationId xmlns:a16="http://schemas.microsoft.com/office/drawing/2014/main" id="{8D9C237C-79CB-5ED1-02C6-C94E1426908F}"/>
-              </a:ext>
-            </a:extLst>
-          </p:cNvPr>
-          <p:cNvGrpSpPr/>
+      <p:sp>
+        <p:nvSpPr>
+          <p:cNvPr id="2" name="Pentagon 1">
+            <a:extLst>
+              <a:ext uri="{FF2B5EF4-FFF2-40B4-BE49-F238E27FC236}">
+                <a16:creationId xmlns:a16="http://schemas.microsoft.com/office/drawing/2014/main" id="{85DBFABD-588B-BA56-86EE-86AE1B9A9E05}"/>
+              </a:ext>
+            </a:extLst>
+          </p:cNvPr>
+          <p:cNvSpPr/>
           <p:nvPr/>
-        </p:nvGrpSpPr>
-        <p:grpSpPr>
-          <a:xfrm>
-            <a:off x="-116541" y="559959"/>
-            <a:ext cx="3088342" cy="805143"/>
-            <a:chOff x="-116541" y="559959"/>
-            <a:chExt cx="3088342" cy="805143"/>
-          </a:xfrm>
-        </p:grpSpPr>
-        <p:sp>
-          <p:nvSpPr>
-            <p:cNvPr id="2" name="Pentagon 1">
-              <a:extLst>
-                <a:ext uri="{FF2B5EF4-FFF2-40B4-BE49-F238E27FC236}">
-                  <a16:creationId xmlns:a16="http://schemas.microsoft.com/office/drawing/2014/main" id="{85DBFABD-588B-BA56-86EE-86AE1B9A9E05}"/>
-                </a:ext>
-              </a:extLst>
-            </p:cNvPr>
-            <p:cNvSpPr/>
-            <p:nvPr/>
-          </p:nvSpPr>
-          <p:spPr>
-            <a:xfrm>
-              <a:off x="-13447" y="559959"/>
-              <a:ext cx="2985248" cy="805143"/>
-            </a:xfrm>
-            <a:prstGeom prst="homePlate">
-              <a:avLst/>
-            </a:prstGeom>
+        </p:nvSpPr>
+        <p:spPr>
+          <a:xfrm>
+            <a:off x="-13447" y="559959"/>
+            <a:ext cx="2985248" cy="805143"/>
+          </a:xfrm>
+          <a:prstGeom prst="homePlate">
+            <a:avLst/>
+          </a:prstGeom>
+          <a:solidFill>
+            <a:srgbClr val="65BB7B"/>
+          </a:solidFill>
+          <a:ln w="3175">
             <a:solidFill>
-              <a:srgbClr val="65BB7B"/>
+              <a:schemeClr val="tx1"/>
             </a:solidFill>
-            <a:ln w="3175">
-              <a:solidFill>
-                <a:schemeClr val="tx1"/>
-              </a:solidFill>
-            </a:ln>
-            <a:effectLst/>
-          </p:spPr>
-          <p:style>
-            <a:lnRef idx="2">
-              <a:schemeClr val="accent1">
-                <a:shade val="50000"/>
-              </a:schemeClr>
-            </a:lnRef>
-            <a:fillRef idx="1">
-              <a:schemeClr val="accent1"/>
-            </a:fillRef>
-            <a:effectRef idx="0">
-              <a:schemeClr val="accent1"/>
-            </a:effectRef>
-            <a:fontRef idx="minor">
-              <a:schemeClr val="lt1"/>
-            </a:fontRef>
-          </p:style>
-          <p:txBody>
-            <a:bodyPr rtlCol="0" anchor="ctr"/>
-            <a:lstStyle/>
-            <a:p>
-              <a:pPr algn="ctr"/>
-              <a:endParaRPr lang="en-US" dirty="0"/>
-            </a:p>
-          </p:txBody>
-        </p:sp>
-        <p:sp>
-          <p:nvSpPr>
-            <p:cNvPr id="4" name="TextBox 3">
-              <a:extLst>
-                <a:ext uri="{FF2B5EF4-FFF2-40B4-BE49-F238E27FC236}">
-                  <a16:creationId xmlns:a16="http://schemas.microsoft.com/office/drawing/2014/main" id="{593AFBD8-44E4-4482-822F-EB3B71BEA588}"/>
-                </a:ext>
-              </a:extLst>
-            </p:cNvPr>
-            <p:cNvSpPr txBox="1"/>
-            <p:nvPr/>
-          </p:nvSpPr>
-          <p:spPr>
-            <a:xfrm>
-              <a:off x="-116541" y="714367"/>
-              <a:ext cx="3074895" cy="553998"/>
-            </a:xfrm>
-            <a:prstGeom prst="rect">
-              <a:avLst/>
-            </a:prstGeom>
-            <a:noFill/>
-          </p:spPr>
-          <p:txBody>
-            <a:bodyPr wrap="square" rtlCol="0">
-              <a:spAutoFit/>
-            </a:bodyPr>
-            <a:lstStyle/>
-            <a:p>
-              <a:pPr algn="ctr"/>
-              <a:r>
-                <a:rPr lang="en-US" sz="3000" dirty="0">
-                  <a:solidFill>
-                    <a:schemeClr val="bg1"/>
-                  </a:solidFill>
-                  <a:latin typeface="Avenir Medium" panose="02000503020000020003" pitchFamily="2" charset="0"/>
-                  <a:cs typeface="Futura Medium" panose="020B0602020204020303" pitchFamily="34" charset="-79"/>
-                </a:rPr>
-                <a:t>Practice</a:t>
-              </a:r>
-            </a:p>
-          </p:txBody>
-        </p:sp>
-      </p:grpSp>
+          </a:ln>
+          <a:effectLst/>
+        </p:spPr>
+        <p:style>
+          <a:lnRef idx="2">
+            <a:schemeClr val="accent1">
+              <a:shade val="50000"/>
+            </a:schemeClr>
+          </a:lnRef>
+          <a:fillRef idx="1">
+            <a:schemeClr val="accent1"/>
+          </a:fillRef>
+          <a:effectRef idx="0">
+            <a:schemeClr val="accent1"/>
+          </a:effectRef>
+          <a:fontRef idx="minor">
+            <a:schemeClr val="lt1"/>
+          </a:fontRef>
+        </p:style>
+        <p:txBody>
+          <a:bodyPr rtlCol="0" anchor="ctr"/>
+          <a:lstStyle/>
+          <a:p>
+            <a:pPr algn="ctr"/>
+            <a:endParaRPr lang="en-US" dirty="0"/>
+          </a:p>
+        </p:txBody>
+      </p:sp>
+      <p:sp>
+        <p:nvSpPr>
+          <p:cNvPr id="4" name="TextBox 3">
+            <a:extLst>
+              <a:ext uri="{FF2B5EF4-FFF2-40B4-BE49-F238E27FC236}">
+                <a16:creationId xmlns:a16="http://schemas.microsoft.com/office/drawing/2014/main" id="{593AFBD8-44E4-4482-822F-EB3B71BEA588}"/>
+              </a:ext>
+            </a:extLst>
+          </p:cNvPr>
+          <p:cNvSpPr txBox="1"/>
+          <p:nvPr/>
+        </p:nvSpPr>
+        <p:spPr>
+          <a:xfrm>
+            <a:off x="-116541" y="714367"/>
+            <a:ext cx="3074895" cy="553998"/>
+          </a:xfrm>
+          <a:prstGeom prst="rect">
+            <a:avLst/>
+          </a:prstGeom>
+          <a:noFill/>
+        </p:spPr>
+        <p:txBody>
+          <a:bodyPr wrap="square" rtlCol="0">
+            <a:spAutoFit/>
+          </a:bodyPr>
+          <a:lstStyle/>
+          <a:p>
+            <a:pPr algn="ctr"/>
+            <a:r>
+              <a:rPr lang="en-US" sz="3000" dirty="0">
+                <a:solidFill>
+                  <a:schemeClr val="bg1"/>
+                </a:solidFill>
+                <a:latin typeface="Avenir Medium" panose="02000503020000020003" pitchFamily="2" charset="0"/>
+                <a:cs typeface="Futura Medium" panose="020B0602020204020303" pitchFamily="34" charset="-79"/>
+              </a:rPr>
+              <a:t>Practice</a:t>
+            </a:r>
+          </a:p>
+        </p:txBody>
+      </p:sp>
       <p:pic>
         <p:nvPicPr>
           <p:cNvPr id="6" name="Picture 5" descr="A picture containing dark, gauge&#10;&#10;Description automatically generated">
@@ -10433,7 +10412,7 @@
       </p:sp>
       <p:pic>
         <p:nvPicPr>
-          <p:cNvPr id="3" name="Picture 2" descr="A green and white logo&#10;&#10;Description automatically generated with low confidence">
+          <p:cNvPr id="3" name="Picture 2">
             <a:extLst>
               <a:ext uri="{FF2B5EF4-FFF2-40B4-BE49-F238E27FC236}">
                 <a16:creationId xmlns:a16="http://schemas.microsoft.com/office/drawing/2014/main" id="{845735AC-AF18-4257-A9FE-DE0BE6D668A3}"/>
@@ -10453,14 +10432,13 @@
               </a:ext>
             </a:extLst>
           </a:blip>
-          <a:stretch>
-            <a:fillRect/>
-          </a:stretch>
+          <a:srcRect/>
+          <a:stretch/>
         </p:blipFill>
         <p:spPr>
           <a:xfrm>
-            <a:off x="2347157" y="2219696"/>
-            <a:ext cx="7497685" cy="2418608"/>
+            <a:off x="2347157" y="2221746"/>
+            <a:ext cx="7497685" cy="2414508"/>
           </a:xfrm>
           <a:prstGeom prst="rect">
             <a:avLst/>

</xml_diff>